<commit_message>
Slides & AndroidKeyCommand file Added
</commit_message>
<xml_diff>
--- a/Slides/XamarinForms+Facebook.pptx
+++ b/Slides/XamarinForms+Facebook.pptx
@@ -124,6 +124,11 @@
       </a:defRPr>
     </a:lvl9pPr>
   </p:defaultTextStyle>
+  <p:extLst>
+    <p:ext uri="{EFAFB233-063F-42B5-8137-9DF3F51BA10A}">
+      <p15:sldGuideLst xmlns:p15="http://schemas.microsoft.com/office/powerpoint/2012/main"/>
+    </p:ext>
+  </p:extLst>
 </p:presentation>
 </file>
 
@@ -2401,13 +2406,13 @@
   <p:clrMapOvr>
     <a:masterClrMapping/>
   </p:clrMapOvr>
-  <mc:AlternateContent xmlns:mc="http://schemas.openxmlformats.org/markup-compatibility/2006">
-    <mc:Choice xmlns:p14="http://schemas.microsoft.com/office/powerpoint/2010/main" Requires="p14">
+  <mc:AlternateContent xmlns:mc="http://schemas.openxmlformats.org/markup-compatibility/2006" xmlns:p14="http://schemas.microsoft.com/office/powerpoint/2010/main">
+    <mc:Choice Requires="p14">
       <p:transition spd="slow" p14:dur="3400">
         <p14:reveal/>
       </p:transition>
     </mc:Choice>
-    <mc:Fallback>
+    <mc:Fallback xmlns="">
       <p:transition spd="slow">
         <p:fade/>
       </p:transition>
@@ -5035,13 +5040,13 @@
   <p:clrMapOvr>
     <a:masterClrMapping/>
   </p:clrMapOvr>
-  <mc:AlternateContent xmlns:mc="http://schemas.openxmlformats.org/markup-compatibility/2006">
-    <mc:Choice xmlns:p14="http://schemas.microsoft.com/office/powerpoint/2010/main" Requires="p14">
+  <mc:AlternateContent xmlns:mc="http://schemas.openxmlformats.org/markup-compatibility/2006" xmlns:p14="http://schemas.microsoft.com/office/powerpoint/2010/main">
+    <mc:Choice Requires="p14">
       <p:transition spd="slow" p14:dur="3400">
         <p14:reveal/>
       </p:transition>
     </mc:Choice>
-    <mc:Fallback>
+    <mc:Fallback xmlns="">
       <p:transition spd="slow">
         <p:fade/>
       </p:transition>
@@ -5231,7 +5236,7 @@
         </p:nvSpPr>
         <p:spPr>
           <a:xfrm>
-            <a:off x="0" y="0"/>
+            <a:off x="1" y="-189024"/>
             <a:ext cx="12191999" cy="2432957"/>
           </a:xfrm>
           <a:prstGeom prst="rect">
@@ -5394,163 +5399,18 @@
           </a:prstGeom>
         </p:spPr>
       </p:pic>
-    </p:spTree>
-    <p:extLst>
-      <p:ext uri="{BB962C8B-B14F-4D97-AF65-F5344CB8AC3E}">
-        <p14:creationId xmlns:p14="http://schemas.microsoft.com/office/powerpoint/2010/main" val="1831120767"/>
-      </p:ext>
-    </p:extLst>
-  </p:cSld>
-  <p:clrMapOvr>
-    <a:masterClrMapping/>
-  </p:clrMapOvr>
-  <p:transition>
-    <p:fade/>
-  </p:transition>
-  <p:timing>
-    <p:tnLst>
-      <p:par>
-        <p:cTn id="1" dur="indefinite" restart="never" nodeType="tmRoot"/>
-      </p:par>
-    </p:tnLst>
-  </p:timing>
-</p:sld>
-</file>
-
-<file path=ppt/slides/slide12.xml><?xml version="1.0" encoding="utf-8"?>
-<p:sld xmlns:a="http://schemas.openxmlformats.org/drawingml/2006/main" xmlns:r="http://schemas.openxmlformats.org/officeDocument/2006/relationships" xmlns:p="http://schemas.openxmlformats.org/presentationml/2006/main">
-  <p:cSld>
-    <p:spTree>
-      <p:nvGrpSpPr>
-        <p:cNvPr id="1" name=""/>
-        <p:cNvGrpSpPr/>
-        <p:nvPr/>
-      </p:nvGrpSpPr>
-      <p:grpSpPr>
-        <a:xfrm>
-          <a:off x="0" y="0"/>
-          <a:ext cx="0" cy="0"/>
-          <a:chOff x="0" y="0"/>
-          <a:chExt cx="0" cy="0"/>
-        </a:xfrm>
-      </p:grpSpPr>
-      <p:sp>
-        <p:nvSpPr>
-          <p:cNvPr id="2" name="Title 1"/>
-          <p:cNvSpPr>
-            <a:spLocks noGrp="1"/>
-          </p:cNvSpPr>
-          <p:nvPr>
-            <p:ph type="title"/>
-          </p:nvPr>
+      <p:sp>
+        <p:nvSpPr>
+          <p:cNvPr id="5" name="Text Placeholder 7"/>
+          <p:cNvSpPr txBox="1">
+            <a:spLocks/>
+          </p:cNvSpPr>
+          <p:nvPr/>
         </p:nvSpPr>
         <p:spPr>
           <a:xfrm>
-            <a:off x="195943" y="2084173"/>
-            <a:ext cx="11593286" cy="1793104"/>
-          </a:xfrm>
-        </p:spPr>
-        <p:txBody>
-          <a:bodyPr/>
-          <a:lstStyle/>
-          <a:p>
-            <a:pPr algn="ctr"/>
-            <a:r>
-              <a:rPr lang="en-US" dirty="0" smtClean="0"/>
-              <a:t>Custom Renderers vs Dependency Service</a:t>
-            </a:r>
-            <a:endParaRPr lang="en-US" dirty="0"/>
-          </a:p>
-        </p:txBody>
-      </p:sp>
-    </p:spTree>
-    <p:extLst>
-      <p:ext uri="{BB962C8B-B14F-4D97-AF65-F5344CB8AC3E}">
-        <p14:creationId xmlns:p14="http://schemas.microsoft.com/office/powerpoint/2010/main" val="735083480"/>
-      </p:ext>
-    </p:extLst>
-  </p:cSld>
-  <p:clrMapOvr>
-    <a:masterClrMapping/>
-  </p:clrMapOvr>
-  <p:transition>
-    <p:fade/>
-  </p:transition>
-  <p:timing>
-    <p:tnLst>
-      <p:par>
-        <p:cTn id="1" dur="indefinite" restart="never" nodeType="tmRoot"/>
-      </p:par>
-    </p:tnLst>
-  </p:timing>
-</p:sld>
-</file>
-
-<file path=ppt/slides/slide13.xml><?xml version="1.0" encoding="utf-8"?>
-<p:sld xmlns:a="http://schemas.openxmlformats.org/drawingml/2006/main" xmlns:r="http://schemas.openxmlformats.org/officeDocument/2006/relationships" xmlns:p="http://schemas.openxmlformats.org/presentationml/2006/main">
-  <p:cSld>
-    <p:spTree>
-      <p:nvGrpSpPr>
-        <p:cNvPr id="1" name=""/>
-        <p:cNvGrpSpPr/>
-        <p:nvPr/>
-      </p:nvGrpSpPr>
-      <p:grpSpPr>
-        <a:xfrm>
-          <a:off x="0" y="0"/>
-          <a:ext cx="0" cy="0"/>
-          <a:chOff x="0" y="0"/>
-          <a:chExt cx="0" cy="0"/>
-        </a:xfrm>
-      </p:grpSpPr>
-      <p:sp>
-        <p:nvSpPr>
-          <p:cNvPr id="2" name="Title 1"/>
-          <p:cNvSpPr>
-            <a:spLocks noGrp="1"/>
-          </p:cNvSpPr>
-          <p:nvPr>
-            <p:ph type="title"/>
-          </p:nvPr>
-        </p:nvSpPr>
-        <p:spPr>
-          <a:xfrm>
-            <a:off x="0" y="-195944"/>
-            <a:ext cx="9860672" cy="1019777"/>
-          </a:xfrm>
-        </p:spPr>
-        <p:txBody>
-          <a:bodyPr>
-            <a:normAutofit fontScale="90000"/>
-          </a:bodyPr>
-          <a:lstStyle/>
-          <a:p>
-            <a:r>
-              <a:rPr lang="en-US" dirty="0" smtClean="0"/>
-              <a:t/>
-            </a:r>
-            <a:br>
-              <a:rPr lang="en-US" dirty="0" smtClean="0"/>
-            </a:br>
-            <a:r>
-              <a:rPr lang="en-US" dirty="0"/>
-              <a:t> Custom Renderers </a:t>
-            </a:r>
-          </a:p>
-        </p:txBody>
-      </p:sp>
-      <p:sp>
-        <p:nvSpPr>
-          <p:cNvPr id="3" name="Text Placeholder 7"/>
-          <p:cNvSpPr txBox="1">
-            <a:spLocks/>
-          </p:cNvSpPr>
-          <p:nvPr/>
-        </p:nvSpPr>
-        <p:spPr>
-          <a:xfrm>
-            <a:off x="498374" y="1189494"/>
-            <a:ext cx="11127569" cy="4507025"/>
+            <a:off x="7670217" y="1695683"/>
+            <a:ext cx="4521783" cy="998535"/>
           </a:xfrm>
           <a:prstGeom prst="rect">
             <a:avLst/>
@@ -5788,28 +5648,16 @@
               <a:buNone/>
             </a:pPr>
             <a:r>
-              <a:rPr lang="en-US" sz="3200" dirty="0" err="1" smtClean="0"/>
-              <a:t>Permiten</a:t>
-            </a:r>
-            <a:r>
-              <a:rPr lang="en-US" sz="3200" dirty="0" smtClean="0"/>
-              <a:t> </a:t>
-            </a:r>
-            <a:r>
-              <a:rPr lang="en-US" sz="3200" dirty="0" err="1" smtClean="0"/>
-              <a:t>renderizar</a:t>
-            </a:r>
-            <a:r>
-              <a:rPr lang="en-US" sz="3200" dirty="0" smtClean="0"/>
-              <a:t> </a:t>
-            </a:r>
-            <a:r>
-              <a:rPr lang="en-US" sz="3200" dirty="0" err="1" smtClean="0"/>
-              <a:t>controles</a:t>
-            </a:r>
-            <a:r>
-              <a:rPr lang="en-US" sz="3200" dirty="0" smtClean="0"/>
-              <a:t> custom</a:t>
+              <a:rPr lang="en-US" sz="3200" smtClean="0"/>
+              <a:t>*iOS </a:t>
+            </a:r>
+            <a:r>
+              <a:rPr lang="en-US" sz="3200" smtClean="0"/>
+              <a:t>Custom </a:t>
+            </a:r>
+            <a:r>
+              <a:rPr lang="en-US" sz="3200" dirty="0"/>
+              <a:t>Entitlements</a:t>
             </a:r>
             <a:endParaRPr lang="en-US" sz="3200" dirty="0"/>
           </a:p>
@@ -5818,7 +5666,7 @@
     </p:spTree>
     <p:extLst>
       <p:ext uri="{BB962C8B-B14F-4D97-AF65-F5344CB8AC3E}">
-        <p14:creationId xmlns:p14="http://schemas.microsoft.com/office/powerpoint/2010/main" val="426898461"/>
+        <p14:creationId xmlns:p14="http://schemas.microsoft.com/office/powerpoint/2010/main" val="1831120767"/>
       </p:ext>
     </p:extLst>
   </p:cSld>
@@ -5838,7 +5686,7 @@
 </p:sld>
 </file>
 
-<file path=ppt/slides/slide14.xml><?xml version="1.0" encoding="utf-8"?>
+<file path=ppt/slides/slide12.xml><?xml version="1.0" encoding="utf-8"?>
 <p:sld xmlns:a="http://schemas.openxmlformats.org/drawingml/2006/main" xmlns:r="http://schemas.openxmlformats.org/officeDocument/2006/relationships" xmlns:p="http://schemas.openxmlformats.org/presentationml/2006/main">
   <p:cSld>
     <p:spTree>
@@ -5865,7 +5713,12 @@
             <p:ph type="title"/>
           </p:nvPr>
         </p:nvSpPr>
-        <p:spPr/>
+        <p:spPr>
+          <a:xfrm>
+            <a:off x="195943" y="2084173"/>
+            <a:ext cx="11593286" cy="1793104"/>
+          </a:xfrm>
+        </p:spPr>
         <p:txBody>
           <a:bodyPr/>
           <a:lstStyle/>
@@ -5873,7 +5726,7 @@
             <a:pPr algn="ctr"/>
             <a:r>
               <a:rPr lang="en-US" dirty="0" smtClean="0"/>
-              <a:t>FB Login Button</a:t>
+              <a:t>Custom Renderers vs Dependency Service</a:t>
             </a:r>
             <a:endParaRPr lang="en-US" dirty="0"/>
           </a:p>
@@ -5882,7 +5735,7 @@
     </p:spTree>
     <p:extLst>
       <p:ext uri="{BB962C8B-B14F-4D97-AF65-F5344CB8AC3E}">
-        <p14:creationId xmlns:p14="http://schemas.microsoft.com/office/powerpoint/2010/main" val="1047148529"/>
+        <p14:creationId xmlns:p14="http://schemas.microsoft.com/office/powerpoint/2010/main" val="735083480"/>
       </p:ext>
     </p:extLst>
   </p:cSld>
@@ -5902,7 +5755,7 @@
 </p:sld>
 </file>
 
-<file path=ppt/slides/slide15.xml><?xml version="1.0" encoding="utf-8"?>
+<file path=ppt/slides/slide13.xml><?xml version="1.0" encoding="utf-8"?>
 <p:sld xmlns:a="http://schemas.openxmlformats.org/drawingml/2006/main" xmlns:r="http://schemas.openxmlformats.org/officeDocument/2006/relationships" xmlns:p="http://schemas.openxmlformats.org/presentationml/2006/main">
   <p:cSld>
     <p:spTree>
@@ -5950,7 +5803,7 @@
             </a:br>
             <a:r>
               <a:rPr lang="en-US" dirty="0"/>
-              <a:t> Dependency Service</a:t>
+              <a:t> Custom Renderers </a:t>
             </a:r>
           </a:p>
         </p:txBody>
@@ -6213,7 +6066,7 @@
             </a:r>
             <a:r>
               <a:rPr lang="en-US" sz="3200" dirty="0" err="1" smtClean="0"/>
-              <a:t>hacer</a:t>
+              <a:t>renderizar</a:t>
             </a:r>
             <a:r>
               <a:rPr lang="en-US" sz="3200" dirty="0" smtClean="0"/>
@@ -6221,39 +6074,11 @@
             </a:r>
             <a:r>
               <a:rPr lang="en-US" sz="3200" dirty="0" err="1" smtClean="0"/>
-              <a:t>llamadas</a:t>
+              <a:t>controles</a:t>
             </a:r>
             <a:r>
               <a:rPr lang="en-US" sz="3200" dirty="0" smtClean="0"/>
-              <a:t> </a:t>
-            </a:r>
-            <a:r>
-              <a:rPr lang="en-US" sz="3200" dirty="0" err="1" smtClean="0"/>
-              <a:t>nativas</a:t>
-            </a:r>
-            <a:r>
-              <a:rPr lang="en-US" sz="3200" dirty="0" smtClean="0"/>
-              <a:t> con </a:t>
-            </a:r>
-            <a:r>
-              <a:rPr lang="en-US" sz="3200" dirty="0" err="1" smtClean="0"/>
-              <a:t>una</a:t>
-            </a:r>
-            <a:r>
-              <a:rPr lang="en-US" sz="3200" dirty="0" smtClean="0"/>
-              <a:t> </a:t>
-            </a:r>
-            <a:r>
-              <a:rPr lang="en-US" sz="3200" dirty="0" err="1" smtClean="0"/>
-              <a:t>implementacion</a:t>
-            </a:r>
-            <a:r>
-              <a:rPr lang="en-US" sz="3200" dirty="0" smtClean="0"/>
-              <a:t> simple de </a:t>
-            </a:r>
-            <a:r>
-              <a:rPr lang="en-US" sz="3200" dirty="0" err="1" smtClean="0"/>
-              <a:t>interfaz</a:t>
+              <a:t> custom</a:t>
             </a:r>
             <a:endParaRPr lang="en-US" sz="3200" dirty="0"/>
           </a:p>
@@ -6262,7 +6087,7 @@
     </p:spTree>
     <p:extLst>
       <p:ext uri="{BB962C8B-B14F-4D97-AF65-F5344CB8AC3E}">
-        <p14:creationId xmlns:p14="http://schemas.microsoft.com/office/powerpoint/2010/main" val="90092455"/>
+        <p14:creationId xmlns:p14="http://schemas.microsoft.com/office/powerpoint/2010/main" val="426898461"/>
       </p:ext>
     </p:extLst>
   </p:cSld>
@@ -6282,7 +6107,7 @@
 </p:sld>
 </file>
 
-<file path=ppt/slides/slide16.xml><?xml version="1.0" encoding="utf-8"?>
+<file path=ppt/slides/slide14.xml><?xml version="1.0" encoding="utf-8"?>
 <p:sld xmlns:a="http://schemas.openxmlformats.org/drawingml/2006/main" xmlns:r="http://schemas.openxmlformats.org/officeDocument/2006/relationships" xmlns:p="http://schemas.openxmlformats.org/presentationml/2006/main">
   <p:cSld>
     <p:spTree>
@@ -6314,9 +6139,10 @@
           <a:bodyPr/>
           <a:lstStyle/>
           <a:p>
+            <a:pPr algn="ctr"/>
             <a:r>
               <a:rPr lang="en-US" dirty="0" smtClean="0"/>
-              <a:t>Login / Logout / Graph Calls / FB Dialogs</a:t>
+              <a:t>FB Login Button</a:t>
             </a:r>
             <a:endParaRPr lang="en-US" dirty="0"/>
           </a:p>
@@ -6325,7 +6151,7 @@
     </p:spTree>
     <p:extLst>
       <p:ext uri="{BB962C8B-B14F-4D97-AF65-F5344CB8AC3E}">
-        <p14:creationId xmlns:p14="http://schemas.microsoft.com/office/powerpoint/2010/main" val="1467946662"/>
+        <p14:creationId xmlns:p14="http://schemas.microsoft.com/office/powerpoint/2010/main" val="1047148529"/>
       </p:ext>
     </p:extLst>
   </p:cSld>
@@ -6345,7 +6171,7 @@
 </p:sld>
 </file>
 
-<file path=ppt/slides/slide17.xml><?xml version="1.0" encoding="utf-8"?>
+<file path=ppt/slides/slide15.xml><?xml version="1.0" encoding="utf-8"?>
 <p:sld xmlns:a="http://schemas.openxmlformats.org/drawingml/2006/main" xmlns:r="http://schemas.openxmlformats.org/officeDocument/2006/relationships" xmlns:p="http://schemas.openxmlformats.org/presentationml/2006/main">
   <p:cSld>
     <p:spTree>
@@ -6374,19 +6200,27 @@
         </p:nvSpPr>
         <p:spPr>
           <a:xfrm>
-            <a:off x="136964" y="-316127"/>
-            <a:ext cx="9860672" cy="1793104"/>
+            <a:off x="0" y="-195944"/>
+            <a:ext cx="9860672" cy="1019777"/>
           </a:xfrm>
         </p:spPr>
         <p:txBody>
-          <a:bodyPr/>
+          <a:bodyPr>
+            <a:normAutofit fontScale="90000"/>
+          </a:bodyPr>
           <a:lstStyle/>
           <a:p>
             <a:r>
-              <a:rPr lang="en-US" smtClean="0"/>
-              <a:t>Referencias</a:t>
-            </a:r>
-            <a:endParaRPr lang="en-US" dirty="0"/>
+              <a:rPr lang="en-US" dirty="0" smtClean="0"/>
+              <a:t/>
+            </a:r>
+            <a:br>
+              <a:rPr lang="en-US" dirty="0" smtClean="0"/>
+            </a:br>
+            <a:r>
+              <a:rPr lang="en-US" dirty="0"/>
+              <a:t> Dependency Service</a:t>
+            </a:r>
           </a:p>
         </p:txBody>
       </p:sp>
@@ -6401,7 +6235,7 @@
         <p:spPr>
           <a:xfrm>
             <a:off x="498374" y="1189494"/>
-            <a:ext cx="11127569" cy="5015363"/>
+            <a:ext cx="11127569" cy="4507025"/>
           </a:xfrm>
           <a:prstGeom prst="rect">
             <a:avLst/>
@@ -6639,246 +6473,65 @@
               <a:buNone/>
             </a:pPr>
             <a:r>
-              <a:rPr lang="en-US" sz="3200" dirty="0" smtClean="0"/>
-              <a:t>FB Developer: </a:t>
-            </a:r>
-            <a:r>
-              <a:rPr lang="en-US" sz="3200" dirty="0" smtClean="0">
-                <a:hlinkClick r:id="rId2"/>
-              </a:rPr>
-              <a:t>https</a:t>
-            </a:r>
-            <a:r>
-              <a:rPr lang="en-US" sz="3200" dirty="0">
-                <a:hlinkClick r:id="rId2"/>
-              </a:rPr>
-              <a:t>://developers.facebook.com</a:t>
-            </a:r>
-            <a:endParaRPr lang="en-US" sz="3200" dirty="0"/>
-          </a:p>
-          <a:p>
-            <a:pPr marL="0" indent="0">
-              <a:lnSpc>
-                <a:spcPct val="150000"/>
-              </a:lnSpc>
-              <a:buNone/>
-            </a:pPr>
-            <a:r>
-              <a:rPr lang="en-US" sz="3200" dirty="0" smtClean="0"/>
-              <a:t>FB Android SDK</a:t>
-            </a:r>
-            <a:r>
-              <a:rPr lang="en-US" sz="3200" dirty="0"/>
-              <a:t>: </a:t>
-            </a:r>
-            <a:r>
-              <a:rPr lang="en-US" sz="3200" dirty="0">
-                <a:hlinkClick r:id="rId3"/>
-              </a:rPr>
-              <a:t>https://</a:t>
-            </a:r>
-            <a:r>
-              <a:rPr lang="en-US" sz="3200" dirty="0" err="1">
-                <a:hlinkClick r:id="rId3"/>
-              </a:rPr>
-              <a:t>developers.facebook.com</a:t>
-            </a:r>
-            <a:r>
-              <a:rPr lang="en-US" sz="3200" dirty="0">
-                <a:hlinkClick r:id="rId3"/>
-              </a:rPr>
-              <a:t>/docs/android</a:t>
-            </a:r>
-            <a:endParaRPr lang="en-US" sz="3200" dirty="0"/>
-          </a:p>
-          <a:p>
-            <a:pPr marL="0" indent="0">
-              <a:lnSpc>
-                <a:spcPct val="150000"/>
-              </a:lnSpc>
-              <a:buNone/>
-            </a:pPr>
-            <a:r>
-              <a:rPr lang="en-US" sz="3200" dirty="0"/>
-              <a:t>FB </a:t>
-            </a:r>
-            <a:r>
-              <a:rPr lang="en-US" sz="3200" dirty="0" smtClean="0"/>
-              <a:t>iOS </a:t>
-            </a:r>
-            <a:r>
-              <a:rPr lang="en-US" sz="3200" dirty="0"/>
-              <a:t>SDK: </a:t>
-            </a:r>
-            <a:r>
-              <a:rPr lang="en-US" sz="3200" dirty="0">
-                <a:hlinkClick r:id="rId4"/>
-              </a:rPr>
-              <a:t>https://</a:t>
-            </a:r>
-            <a:r>
-              <a:rPr lang="en-US" sz="3200" dirty="0" err="1">
-                <a:hlinkClick r:id="rId4"/>
-              </a:rPr>
-              <a:t>developers.facebook.com</a:t>
-            </a:r>
-            <a:r>
-              <a:rPr lang="en-US" sz="3200" dirty="0">
-                <a:hlinkClick r:id="rId4"/>
-              </a:rPr>
-              <a:t>/docs/</a:t>
-            </a:r>
-            <a:r>
-              <a:rPr lang="en-US" sz="3200" dirty="0" err="1">
-                <a:hlinkClick r:id="rId4"/>
-              </a:rPr>
-              <a:t>ios</a:t>
-            </a:r>
-            <a:endParaRPr lang="en-US" sz="3200" dirty="0" smtClean="0"/>
-          </a:p>
-          <a:p>
-            <a:pPr marL="0" indent="0">
-              <a:lnSpc>
-                <a:spcPct val="150000"/>
-              </a:lnSpc>
-              <a:buNone/>
-            </a:pPr>
-            <a:r>
               <a:rPr lang="en-US" sz="3200" dirty="0" err="1" smtClean="0"/>
-              <a:t>Xamarin</a:t>
-            </a:r>
-            <a:r>
-              <a:rPr lang="en-US" sz="3200" dirty="0"/>
-              <a:t> Custom </a:t>
-            </a:r>
-            <a:r>
-              <a:rPr lang="en-US" sz="3200" dirty="0" smtClean="0"/>
-              <a:t>Renderers: </a:t>
-            </a:r>
-            <a:r>
-              <a:rPr lang="en-US" sz="1600" dirty="0">
-                <a:hlinkClick r:id="rId5"/>
-              </a:rPr>
-              <a:t>https://developer.xamarin.com/guides/xamarin-forms/custom-renderer/</a:t>
-            </a:r>
-            <a:endParaRPr lang="en-US" sz="1600" dirty="0" smtClean="0"/>
-          </a:p>
-          <a:p>
-            <a:pPr marL="0" lvl="0" indent="0" defTabSz="914400">
-              <a:lnSpc>
-                <a:spcPct val="150000"/>
-              </a:lnSpc>
-              <a:spcBef>
-                <a:spcPts val="0"/>
-              </a:spcBef>
-              <a:buSzTx/>
-              <a:buNone/>
-            </a:pPr>
-            <a:r>
-              <a:rPr lang="en-US" sz="3200" dirty="0" err="1">
-                <a:solidFill>
-                  <a:prstClr val="black"/>
-                </a:solidFill>
-              </a:rPr>
-              <a:t>Xamarin</a:t>
-            </a:r>
-            <a:r>
-              <a:rPr lang="en-US" sz="3200" dirty="0">
-                <a:solidFill>
-                  <a:prstClr val="black"/>
-                </a:solidFill>
-              </a:rPr>
-              <a:t> Dependency Service</a:t>
-            </a:r>
-            <a:r>
-              <a:rPr lang="en-US" sz="3200" dirty="0">
-                <a:solidFill>
-                  <a:prstClr val="black"/>
-                </a:solidFill>
-                <a:latin typeface="Calibri" panose="020F0502020204030204"/>
-              </a:rPr>
-              <a:t>: </a:t>
-            </a:r>
-            <a:r>
-              <a:rPr lang="en-US" sz="1400" dirty="0">
-                <a:solidFill>
-                  <a:prstClr val="black"/>
-                </a:solidFill>
-                <a:latin typeface="Calibri" panose="020F0502020204030204"/>
-                <a:hlinkClick r:id="rId6"/>
-              </a:rPr>
-              <a:t>https://developer.xamarin.com/guides/xamarin-forms/dependency-service</a:t>
-            </a:r>
-            <a:r>
-              <a:rPr lang="en-US" sz="1400" dirty="0" smtClean="0">
-                <a:solidFill>
-                  <a:prstClr val="black"/>
-                </a:solidFill>
-                <a:latin typeface="Calibri" panose="020F0502020204030204"/>
-                <a:hlinkClick r:id="rId6"/>
-              </a:rPr>
-              <a:t>/</a:t>
-            </a:r>
-            <a:endParaRPr lang="en-US" sz="3200" dirty="0" smtClean="0"/>
-          </a:p>
-          <a:p>
-            <a:pPr marL="0" indent="0">
-              <a:lnSpc>
-                <a:spcPct val="150000"/>
-              </a:lnSpc>
-              <a:buNone/>
-            </a:pPr>
-            <a:r>
-              <a:rPr lang="en-US" sz="3200" dirty="0" err="1" smtClean="0"/>
-              <a:t>Codigo</a:t>
-            </a:r>
-            <a:r>
-              <a:rPr lang="en-US" sz="3200" dirty="0" smtClean="0"/>
-              <a:t> de </a:t>
-            </a:r>
-            <a:r>
-              <a:rPr lang="en-US" sz="3200" dirty="0" err="1" smtClean="0"/>
-              <a:t>Ejemplo</a:t>
-            </a:r>
-            <a:r>
-              <a:rPr lang="en-US" sz="3200" dirty="0" smtClean="0"/>
-              <a:t>: </a:t>
-            </a:r>
-            <a:r>
-              <a:rPr lang="en-US" sz="3200" dirty="0">
-                <a:hlinkClick r:id="rId7"/>
-              </a:rPr>
-              <a:t>https://goo.gl/Y8I9Dp</a:t>
-            </a:r>
-            <a:endParaRPr lang="en-US" sz="3200" dirty="0"/>
-          </a:p>
-          <a:p>
-            <a:pPr marL="0" indent="0">
-              <a:lnSpc>
-                <a:spcPct val="150000"/>
-              </a:lnSpc>
-              <a:buNone/>
-            </a:pPr>
+              <a:t>Permiten</a:t>
+            </a:r>
             <a:r>
               <a:rPr lang="en-US" sz="3200" dirty="0" smtClean="0"/>
               <a:t> </a:t>
             </a:r>
-          </a:p>
-          <a:p>
-            <a:pPr marL="0" indent="0">
-              <a:lnSpc>
-                <a:spcPct val="150000"/>
-              </a:lnSpc>
-              <a:buNone/>
-            </a:pPr>
-            <a:endParaRPr lang="en-US" sz="1400" dirty="0"/>
+            <a:r>
+              <a:rPr lang="en-US" sz="3200" dirty="0" err="1" smtClean="0"/>
+              <a:t>hacer</a:t>
+            </a:r>
+            <a:r>
+              <a:rPr lang="en-US" sz="3200" dirty="0" smtClean="0"/>
+              <a:t> </a:t>
+            </a:r>
+            <a:r>
+              <a:rPr lang="en-US" sz="3200" dirty="0" err="1" smtClean="0"/>
+              <a:t>llamadas</a:t>
+            </a:r>
+            <a:r>
+              <a:rPr lang="en-US" sz="3200" dirty="0" smtClean="0"/>
+              <a:t> </a:t>
+            </a:r>
+            <a:r>
+              <a:rPr lang="en-US" sz="3200" dirty="0" err="1" smtClean="0"/>
+              <a:t>nativas</a:t>
+            </a:r>
+            <a:r>
+              <a:rPr lang="en-US" sz="3200" dirty="0" smtClean="0"/>
+              <a:t> con </a:t>
+            </a:r>
+            <a:r>
+              <a:rPr lang="en-US" sz="3200" dirty="0" err="1" smtClean="0"/>
+              <a:t>una</a:t>
+            </a:r>
+            <a:r>
+              <a:rPr lang="en-US" sz="3200" dirty="0" smtClean="0"/>
+              <a:t> </a:t>
+            </a:r>
+            <a:r>
+              <a:rPr lang="en-US" sz="3200" dirty="0" err="1" smtClean="0"/>
+              <a:t>implementacion</a:t>
+            </a:r>
+            <a:r>
+              <a:rPr lang="en-US" sz="3200" dirty="0" smtClean="0"/>
+              <a:t> simple de </a:t>
+            </a:r>
+            <a:r>
+              <a:rPr lang="en-US" sz="3200" dirty="0" err="1" smtClean="0"/>
+              <a:t>interfaz</a:t>
+            </a:r>
+            <a:endParaRPr lang="en-US" sz="3200" dirty="0"/>
           </a:p>
         </p:txBody>
       </p:sp>
     </p:spTree>
     <p:extLst>
       <p:ext uri="{BB962C8B-B14F-4D97-AF65-F5344CB8AC3E}">
-        <p14:creationId xmlns:p14="http://schemas.microsoft.com/office/powerpoint/2010/main" val="29277820"/>
+        <p14:creationId xmlns:p14="http://schemas.microsoft.com/office/powerpoint/2010/main" val="90092455"/>
       </p:ext>
     </p:extLst>
   </p:cSld>
@@ -6898,7 +6551,7 @@
 </p:sld>
 </file>
 
-<file path=ppt/slides/slide18.xml><?xml version="1.0" encoding="utf-8"?>
+<file path=ppt/slides/slide16.xml><?xml version="1.0" encoding="utf-8"?>
 <p:sld xmlns:a="http://schemas.openxmlformats.org/drawingml/2006/main" xmlns:r="http://schemas.openxmlformats.org/officeDocument/2006/relationships" xmlns:p="http://schemas.openxmlformats.org/presentationml/2006/main">
   <p:cSld>
     <p:spTree>
@@ -6917,826 +6570,31 @@
       </p:grpSpPr>
       <p:sp>
         <p:nvSpPr>
-          <p:cNvPr id="27" name="Text Placeholder 25"/>
-          <p:cNvSpPr txBox="1">
-            <a:spLocks/>
-          </p:cNvSpPr>
-          <p:nvPr/>
-        </p:nvSpPr>
-        <p:spPr bwMode="invGray">
-          <a:xfrm>
-            <a:off x="1556293" y="1685952"/>
-            <a:ext cx="10321336" cy="821723"/>
-          </a:xfrm>
-          <a:prstGeom prst="rect">
-            <a:avLst/>
-          </a:prstGeom>
-        </p:spPr>
-        <p:txBody>
-          <a:bodyPr vert="horz" wrap="square" lIns="179285" tIns="143428" rIns="179285" bIns="143428" rtlCol="0" anchor="t">
-            <a:noAutofit/>
-          </a:bodyPr>
-          <a:lstStyle>
-            <a:lvl1pPr marL="0" indent="0" algn="l" defTabSz="914166" rtl="0" eaLnBrk="1" latinLnBrk="0" hangingPunct="1">
-              <a:spcBef>
-                <a:spcPct val="20000"/>
-              </a:spcBef>
-              <a:buFont typeface="Arial" pitchFamily="34" charset="0"/>
-              <a:buNone/>
-              <a:defRPr sz="6700" kern="1200" spc="-153">
-                <a:gradFill>
-                  <a:gsLst>
-                    <a:gs pos="0">
-                      <a:schemeClr val="tx1"/>
-                    </a:gs>
-                    <a:gs pos="100000">
-                      <a:schemeClr val="tx1"/>
-                    </a:gs>
-                  </a:gsLst>
-                  <a:lin ang="5400000" scaled="0"/>
-                </a:gradFill>
-                <a:latin typeface="+mj-lt"/>
-                <a:ea typeface="+mn-ea"/>
-                <a:cs typeface="+mn-cs"/>
-              </a:defRPr>
-            </a:lvl1pPr>
-            <a:lvl2pPr marL="0" indent="0" algn="l" defTabSz="914166" rtl="0" eaLnBrk="1" latinLnBrk="0" hangingPunct="1">
-              <a:spcBef>
-                <a:spcPct val="20000"/>
-              </a:spcBef>
-              <a:buFont typeface="Arial" pitchFamily="34" charset="0"/>
-              <a:buNone/>
-              <a:defRPr sz="2800" kern="1200">
-                <a:gradFill>
-                  <a:gsLst>
-                    <a:gs pos="0">
-                      <a:schemeClr val="tx1"/>
-                    </a:gs>
-                    <a:gs pos="100000">
-                      <a:schemeClr val="tx1"/>
-                    </a:gs>
-                  </a:gsLst>
-                  <a:lin ang="5400000" scaled="0"/>
-                </a:gradFill>
-                <a:latin typeface="+mn-lt"/>
-                <a:ea typeface="+mn-ea"/>
-                <a:cs typeface="+mn-cs"/>
-              </a:defRPr>
-            </a:lvl2pPr>
-            <a:lvl3pPr marL="457082" indent="-228541" algn="l" defTabSz="914166" rtl="0" eaLnBrk="1" latinLnBrk="0" hangingPunct="1">
-              <a:spcBef>
-                <a:spcPct val="20000"/>
-              </a:spcBef>
-              <a:buFont typeface="Arial" pitchFamily="34" charset="0"/>
-              <a:buChar char="•"/>
-              <a:defRPr sz="2400" kern="1200">
-                <a:gradFill>
-                  <a:gsLst>
-                    <a:gs pos="0">
-                      <a:schemeClr val="tx1"/>
-                    </a:gs>
-                    <a:gs pos="100000">
-                      <a:schemeClr val="tx1"/>
-                    </a:gs>
-                  </a:gsLst>
-                  <a:lin ang="5400000" scaled="0"/>
-                </a:gradFill>
-                <a:latin typeface="+mn-lt"/>
-                <a:ea typeface="+mn-ea"/>
-                <a:cs typeface="+mn-cs"/>
-              </a:defRPr>
-            </a:lvl3pPr>
-            <a:lvl4pPr marL="739586" indent="-282503" algn="l" defTabSz="914166" rtl="0" eaLnBrk="1" latinLnBrk="0" hangingPunct="1">
-              <a:spcBef>
-                <a:spcPct val="20000"/>
-              </a:spcBef>
-              <a:buFont typeface="Arial" pitchFamily="34" charset="0"/>
-              <a:buChar char="–"/>
-              <a:defRPr sz="2000" kern="1200">
-                <a:gradFill>
-                  <a:gsLst>
-                    <a:gs pos="0">
-                      <a:schemeClr val="tx1"/>
-                    </a:gs>
-                    <a:gs pos="100000">
-                      <a:schemeClr val="tx1"/>
-                    </a:gs>
-                  </a:gsLst>
-                  <a:lin ang="5400000" scaled="0"/>
-                </a:gradFill>
-                <a:latin typeface="+mn-lt"/>
-                <a:ea typeface="+mn-ea"/>
-                <a:cs typeface="+mn-cs"/>
-              </a:defRPr>
-            </a:lvl4pPr>
-            <a:lvl5pPr marL="1033199" indent="-293612" algn="l" defTabSz="914166" rtl="0" eaLnBrk="1" latinLnBrk="0" hangingPunct="1">
-              <a:spcBef>
-                <a:spcPct val="20000"/>
-              </a:spcBef>
-              <a:buFont typeface="Arial" pitchFamily="34" charset="0"/>
-              <a:buChar char="»"/>
-              <a:defRPr sz="1800" kern="1200">
-                <a:gradFill>
-                  <a:gsLst>
-                    <a:gs pos="0">
-                      <a:schemeClr val="tx1"/>
-                    </a:gs>
-                    <a:gs pos="100000">
-                      <a:schemeClr val="tx1"/>
-                    </a:gs>
-                  </a:gsLst>
-                  <a:lin ang="5400000" scaled="0"/>
-                </a:gradFill>
-                <a:latin typeface="+mn-lt"/>
-                <a:ea typeface="+mn-ea"/>
-                <a:cs typeface="+mn-cs"/>
-              </a:defRPr>
-            </a:lvl5pPr>
-            <a:lvl6pPr marL="2513956" indent="-228541" algn="l" defTabSz="914166" rtl="0" eaLnBrk="1" latinLnBrk="0" hangingPunct="1">
-              <a:spcBef>
-                <a:spcPct val="20000"/>
-              </a:spcBef>
-              <a:buFont typeface="Arial" pitchFamily="34" charset="0"/>
-              <a:buChar char="•"/>
-              <a:defRPr sz="2000" kern="1200">
-                <a:solidFill>
-                  <a:schemeClr val="tx1"/>
-                </a:solidFill>
-                <a:latin typeface="+mn-lt"/>
-                <a:ea typeface="+mn-ea"/>
-                <a:cs typeface="+mn-cs"/>
-              </a:defRPr>
-            </a:lvl6pPr>
-            <a:lvl7pPr marL="2971038" indent="-228541" algn="l" defTabSz="914166" rtl="0" eaLnBrk="1" latinLnBrk="0" hangingPunct="1">
-              <a:spcBef>
-                <a:spcPct val="20000"/>
-              </a:spcBef>
-              <a:buFont typeface="Arial" pitchFamily="34" charset="0"/>
-              <a:buChar char="•"/>
-              <a:defRPr sz="2000" kern="1200">
-                <a:solidFill>
-                  <a:schemeClr val="tx1"/>
-                </a:solidFill>
-                <a:latin typeface="+mn-lt"/>
-                <a:ea typeface="+mn-ea"/>
-                <a:cs typeface="+mn-cs"/>
-              </a:defRPr>
-            </a:lvl7pPr>
-            <a:lvl8pPr marL="3428122" indent="-228541" algn="l" defTabSz="914166" rtl="0" eaLnBrk="1" latinLnBrk="0" hangingPunct="1">
-              <a:spcBef>
-                <a:spcPct val="20000"/>
-              </a:spcBef>
-              <a:buFont typeface="Arial" pitchFamily="34" charset="0"/>
-              <a:buChar char="•"/>
-              <a:defRPr sz="2000" kern="1200">
-                <a:solidFill>
-                  <a:schemeClr val="tx1"/>
-                </a:solidFill>
-                <a:latin typeface="+mn-lt"/>
-                <a:ea typeface="+mn-ea"/>
-                <a:cs typeface="+mn-cs"/>
-              </a:defRPr>
-            </a:lvl8pPr>
-            <a:lvl9pPr marL="3885204" indent="-228541" algn="l" defTabSz="914166" rtl="0" eaLnBrk="1" latinLnBrk="0" hangingPunct="1">
-              <a:spcBef>
-                <a:spcPct val="20000"/>
-              </a:spcBef>
-              <a:buFont typeface="Arial" pitchFamily="34" charset="0"/>
-              <a:buChar char="•"/>
-              <a:defRPr sz="2000" kern="1200">
-                <a:solidFill>
-                  <a:schemeClr val="tx1"/>
-                </a:solidFill>
-                <a:latin typeface="+mn-lt"/>
-                <a:ea typeface="+mn-ea"/>
-                <a:cs typeface="+mn-cs"/>
-              </a:defRPr>
-            </a:lvl9pPr>
-          </a:lstStyle>
-          <a:p>
-            <a:pPr defTabSz="914367">
-              <a:lnSpc>
-                <a:spcPct val="60000"/>
-              </a:lnSpc>
-              <a:buClr>
-                <a:srgbClr val="FFFFFF"/>
-              </a:buClr>
-              <a:buSzPct val="90000"/>
-            </a:pPr>
-            <a:r>
-              <a:rPr lang="en-US" sz="7646" spc="0" dirty="0" smtClean="0">
-                <a:solidFill>
-                  <a:schemeClr val="tx1"/>
-                </a:solidFill>
-              </a:rPr>
-              <a:t>Gracias, ¿</a:t>
-            </a:r>
-            <a:r>
-              <a:rPr lang="en-US" sz="7646" spc="0" dirty="0" err="1" smtClean="0">
-                <a:solidFill>
-                  <a:schemeClr val="tx1"/>
-                </a:solidFill>
-              </a:rPr>
-              <a:t>Preguntas</a:t>
-            </a:r>
-            <a:r>
-              <a:rPr lang="en-US" sz="7646" spc="0" dirty="0" smtClean="0">
-                <a:solidFill>
-                  <a:schemeClr val="tx1"/>
-                </a:solidFill>
-              </a:rPr>
-              <a:t>?</a:t>
-            </a:r>
-            <a:endParaRPr lang="en-US" sz="7646" spc="0" dirty="0">
-              <a:solidFill>
-                <a:schemeClr val="tx1"/>
-              </a:solidFill>
-              <a:latin typeface="+mn-lt"/>
-            </a:endParaRPr>
-          </a:p>
-        </p:txBody>
-      </p:sp>
-      <p:sp>
-        <p:nvSpPr>
-          <p:cNvPr id="8" name="TextBox 7"/>
-          <p:cNvSpPr txBox="1"/>
-          <p:nvPr/>
-        </p:nvSpPr>
-        <p:spPr>
-          <a:xfrm>
-            <a:off x="4145965" y="-846623"/>
-            <a:ext cx="362072" cy="621556"/>
-          </a:xfrm>
-          <a:prstGeom prst="rect">
-            <a:avLst/>
-          </a:prstGeom>
-          <a:noFill/>
-        </p:spPr>
-        <p:txBody>
-          <a:bodyPr wrap="none" lIns="179285" tIns="143428" rIns="179285" bIns="143428" rtlCol="0">
-            <a:spAutoFit/>
-          </a:bodyPr>
+          <p:cNvPr id="2" name="Title 1"/>
+          <p:cNvSpPr>
+            <a:spLocks noGrp="1"/>
+          </p:cNvSpPr>
+          <p:nvPr>
+            <p:ph type="title"/>
+          </p:nvPr>
+        </p:nvSpPr>
+        <p:spPr/>
+        <p:txBody>
+          <a:bodyPr/>
           <a:lstStyle/>
           <a:p>
-            <a:pPr>
-              <a:lnSpc>
-                <a:spcPct val="90000"/>
-              </a:lnSpc>
-              <a:spcAft>
-                <a:spcPts val="588"/>
-              </a:spcAft>
-            </a:pPr>
-            <a:endParaRPr lang="en-US" sz="2353" dirty="0" err="1">
-              <a:gradFill>
-                <a:gsLst>
-                  <a:gs pos="2917">
-                    <a:schemeClr val="tx1"/>
-                  </a:gs>
-                  <a:gs pos="30000">
-                    <a:schemeClr val="tx1"/>
-                  </a:gs>
-                </a:gsLst>
-                <a:lin ang="5400000" scaled="0"/>
-              </a:gradFill>
-            </a:endParaRPr>
-          </a:p>
-        </p:txBody>
-      </p:sp>
-      <p:sp>
-        <p:nvSpPr>
-          <p:cNvPr id="12" name="TextBox 11"/>
-          <p:cNvSpPr txBox="1"/>
-          <p:nvPr/>
-        </p:nvSpPr>
-        <p:spPr>
-          <a:xfrm>
-            <a:off x="1736345" y="4325390"/>
-            <a:ext cx="4122014" cy="942965"/>
-          </a:xfrm>
-          <a:prstGeom prst="rect">
-            <a:avLst/>
-          </a:prstGeom>
-          <a:noFill/>
-          <a:ln w="12700" cap="flat">
-            <a:noFill/>
-            <a:miter lim="400000"/>
-          </a:ln>
-          <a:effectLst/>
-        </p:spPr>
-        <p:style>
-          <a:lnRef idx="0">
-            <a:scrgbClr r="0" g="0" b="0"/>
-          </a:lnRef>
-          <a:fillRef idx="0">
-            <a:scrgbClr r="0" g="0" b="0"/>
-          </a:fillRef>
-          <a:effectRef idx="0">
-            <a:scrgbClr r="0" g="0" b="0"/>
-          </a:effectRef>
-          <a:fontRef idx="none"/>
-        </p:style>
-        <p:txBody>
-          <a:bodyPr rot="0" spcFirstLastPara="1" vertOverflow="overflow" horzOverflow="overflow" vert="horz" wrap="square" lIns="18676" tIns="18676" rIns="18676" bIns="18676" numCol="1" spcCol="14288" rtlCol="0" anchor="ctr">
-            <a:spAutoFit/>
-          </a:bodyPr>
-          <a:lstStyle/>
-          <a:p>
-            <a:r>
-              <a:rPr lang="en-US" sz="2000" dirty="0" smtClean="0"/>
-              <a:t>Alejandro Ruiz / Guillermo </a:t>
-            </a:r>
-            <a:r>
-              <a:rPr lang="en-US" sz="2000" dirty="0" err="1" smtClean="0"/>
-              <a:t>Tinoco</a:t>
-            </a:r>
-            <a:endParaRPr lang="en-US" sz="2000" dirty="0" smtClean="0"/>
-          </a:p>
-          <a:p>
-            <a:r>
-              <a:rPr lang="en-US" sz="1961" dirty="0" smtClean="0">
-                <a:cs typeface="Arial"/>
-              </a:rPr>
-              <a:t>Los </a:t>
-            </a:r>
-            <a:r>
-              <a:rPr lang="en-US" sz="1961" dirty="0" err="1" smtClean="0">
-                <a:cs typeface="Arial"/>
-              </a:rPr>
-              <a:t>Xamarinos</a:t>
-            </a:r>
-            <a:endParaRPr lang="en-US" sz="1961" dirty="0">
-              <a:cs typeface="Arial"/>
-            </a:endParaRPr>
-          </a:p>
-          <a:p>
-            <a:r>
-              <a:rPr lang="en-US" sz="1961" dirty="0" err="1" smtClean="0">
-                <a:latin typeface="+mj-lt"/>
-                <a:cs typeface="Arial"/>
-              </a:rPr>
-              <a:t>Xamarin.Forms</a:t>
-            </a:r>
-            <a:r>
-              <a:rPr lang="en-US" sz="1961" dirty="0" smtClean="0">
-                <a:latin typeface="+mj-lt"/>
-                <a:cs typeface="Arial"/>
-              </a:rPr>
-              <a:t> + Facebook</a:t>
-            </a:r>
-            <a:endParaRPr lang="en-US" sz="1961" dirty="0">
-              <a:latin typeface="+mj-lt"/>
-              <a:cs typeface="Arial"/>
-            </a:endParaRPr>
-          </a:p>
-        </p:txBody>
-      </p:sp>
-      <p:cxnSp>
-        <p:nvCxnSpPr>
-          <p:cNvPr id="14" name="Straight Connector 13"/>
-          <p:cNvCxnSpPr/>
-          <p:nvPr/>
-        </p:nvCxnSpPr>
-        <p:spPr>
-          <a:xfrm flipV="1">
-            <a:off x="1775731" y="5590692"/>
-            <a:ext cx="9367329" cy="4668"/>
-          </a:xfrm>
-          <a:prstGeom prst="line">
-            <a:avLst/>
-          </a:prstGeom>
-          <a:ln>
-            <a:solidFill>
-              <a:srgbClr val="16ACEE"/>
-            </a:solidFill>
-            <a:headEnd type="none"/>
-            <a:tailEnd type="none"/>
-          </a:ln>
-        </p:spPr>
-        <p:style>
-          <a:lnRef idx="2">
-            <a:schemeClr val="accent6"/>
-          </a:lnRef>
-          <a:fillRef idx="0">
-            <a:schemeClr val="accent6"/>
-          </a:fillRef>
-          <a:effectRef idx="1">
-            <a:schemeClr val="accent6"/>
-          </a:effectRef>
-          <a:fontRef idx="minor">
-            <a:schemeClr val="tx1"/>
-          </a:fontRef>
-        </p:style>
-      </p:cxnSp>
-      <p:grpSp>
-        <p:nvGrpSpPr>
-          <p:cNvPr id="9" name="Group 8"/>
-          <p:cNvGrpSpPr/>
-          <p:nvPr/>
-        </p:nvGrpSpPr>
-        <p:grpSpPr>
-          <a:xfrm>
-            <a:off x="1701028" y="5819471"/>
-            <a:ext cx="6120358" cy="772446"/>
-            <a:chOff x="1735136" y="5935664"/>
-            <a:chExt cx="6243084" cy="787935"/>
-          </a:xfrm>
-        </p:grpSpPr>
-        <p:sp>
-          <p:nvSpPr>
-            <p:cNvPr id="10" name="TextBox 9"/>
-            <p:cNvSpPr txBox="1"/>
-            <p:nvPr/>
-          </p:nvSpPr>
-          <p:spPr>
-            <a:xfrm>
-              <a:off x="1735136" y="5935664"/>
-              <a:ext cx="6243084" cy="780882"/>
-            </a:xfrm>
-            <a:prstGeom prst="rect">
-              <a:avLst/>
-            </a:prstGeom>
-            <a:noFill/>
-          </p:spPr>
-          <p:txBody>
-            <a:bodyPr wrap="square" rtlCol="0">
-              <a:spAutoFit/>
-            </a:bodyPr>
-            <a:lstStyle/>
-            <a:p>
-              <a:pPr>
-                <a:lnSpc>
-                  <a:spcPct val="130000"/>
-                </a:lnSpc>
-              </a:pPr>
-              <a:r>
-                <a:rPr lang="en-US" sz="1600" dirty="0" smtClean="0">
-                  <a:hlinkClick r:id="rId3"/>
-                </a:rPr>
-                <a:t>alejandro.ruiz@xamarinos.com</a:t>
-              </a:r>
-              <a:r>
-                <a:rPr lang="en-US" sz="1600" dirty="0" smtClean="0"/>
-                <a:t> - </a:t>
-              </a:r>
-              <a:r>
-                <a:rPr lang="en-US" sz="1600" dirty="0" smtClean="0">
-                  <a:hlinkClick r:id="rId4"/>
-                </a:rPr>
-                <a:t>guillermo.tinoco@xamarinos.com</a:t>
-              </a:r>
-              <a:r>
-                <a:rPr lang="en-US" sz="1600" dirty="0" smtClean="0"/>
-                <a:t> </a:t>
-              </a:r>
-            </a:p>
-            <a:p>
-              <a:pPr>
-                <a:lnSpc>
-                  <a:spcPct val="130000"/>
-                </a:lnSpc>
-              </a:pPr>
-              <a:endParaRPr lang="en-US" sz="1765" dirty="0">
-                <a:latin typeface="+mj-lt"/>
-                <a:cs typeface="Arial"/>
-              </a:endParaRPr>
-            </a:p>
-          </p:txBody>
-        </p:sp>
-        <p:sp>
-          <p:nvSpPr>
-            <p:cNvPr id="15" name="TextBox 14"/>
-            <p:cNvSpPr txBox="1"/>
-            <p:nvPr/>
-          </p:nvSpPr>
-          <p:spPr>
-            <a:xfrm>
-              <a:off x="2743242" y="6269224"/>
-              <a:ext cx="3138277" cy="454375"/>
-            </a:xfrm>
-            <a:prstGeom prst="rect">
-              <a:avLst/>
-            </a:prstGeom>
-            <a:noFill/>
-          </p:spPr>
-          <p:txBody>
-            <a:bodyPr wrap="square" rtlCol="0">
-              <a:spAutoFit/>
-            </a:bodyPr>
-            <a:lstStyle/>
-            <a:p>
-              <a:pPr>
-                <a:lnSpc>
-                  <a:spcPct val="130000"/>
-                </a:lnSpc>
-              </a:pPr>
-              <a:r>
-                <a:rPr lang="en-US" sz="1765" dirty="0" smtClean="0">
-                  <a:latin typeface="+mj-lt"/>
-                  <a:cs typeface="Arial"/>
-                </a:rPr>
-                <a:t>@</a:t>
-              </a:r>
-              <a:r>
-                <a:rPr lang="en-US" sz="1765" dirty="0" err="1" smtClean="0">
-                  <a:latin typeface="+mj-lt"/>
-                  <a:cs typeface="Arial"/>
-                </a:rPr>
-                <a:t>alejandroruizva</a:t>
-              </a:r>
-              <a:r>
-                <a:rPr lang="en-US" sz="1765" dirty="0" smtClean="0">
-                  <a:latin typeface="+mj-lt"/>
-                  <a:cs typeface="Arial"/>
-                </a:rPr>
-                <a:t> - @</a:t>
-              </a:r>
-              <a:r>
-                <a:rPr lang="cs-CZ" sz="1765" dirty="0" smtClean="0">
-                  <a:latin typeface="+mj-lt"/>
-                  <a:cs typeface="Arial"/>
-                </a:rPr>
-                <a:t>m3mo89</a:t>
-              </a:r>
-              <a:endParaRPr lang="en-US" sz="1765" dirty="0">
-                <a:latin typeface="+mj-lt"/>
-                <a:cs typeface="Arial"/>
-              </a:endParaRPr>
-            </a:p>
-          </p:txBody>
-        </p:sp>
-      </p:grpSp>
-      <p:sp>
-        <p:nvSpPr>
-          <p:cNvPr id="13" name="TextBox 12"/>
-          <p:cNvSpPr txBox="1"/>
-          <p:nvPr/>
-        </p:nvSpPr>
-        <p:spPr>
-          <a:xfrm>
-            <a:off x="7821386" y="6299499"/>
-            <a:ext cx="4559270" cy="765532"/>
-          </a:xfrm>
-          <a:prstGeom prst="rect">
-            <a:avLst/>
-          </a:prstGeom>
-          <a:noFill/>
-        </p:spPr>
-        <p:txBody>
-          <a:bodyPr wrap="square" rtlCol="0">
-            <a:spAutoFit/>
-          </a:bodyPr>
-          <a:lstStyle/>
-          <a:p>
-            <a:pPr>
-              <a:lnSpc>
-                <a:spcPct val="130000"/>
-              </a:lnSpc>
-            </a:pPr>
-            <a:r>
-              <a:rPr lang="en-US" sz="1600" dirty="0" smtClean="0">
-                <a:hlinkClick r:id="rId5"/>
-              </a:rPr>
-              <a:t>http://</a:t>
-            </a:r>
-            <a:r>
-              <a:rPr lang="en-US" sz="1600" dirty="0" err="1" smtClean="0">
-                <a:hlinkClick r:id="rId5"/>
-              </a:rPr>
-              <a:t>alejandroruizvarela.blogspot.com</a:t>
-            </a:r>
-            <a:r>
-              <a:rPr lang="en-US" sz="1600" dirty="0" smtClean="0">
-                <a:hlinkClick r:id="rId5"/>
-              </a:rPr>
-              <a:t> </a:t>
-            </a:r>
-            <a:endParaRPr lang="en-US" sz="1600" dirty="0" smtClean="0"/>
-          </a:p>
-          <a:p>
-            <a:pPr>
-              <a:lnSpc>
-                <a:spcPct val="130000"/>
-              </a:lnSpc>
-            </a:pPr>
-            <a:endParaRPr lang="en-US" sz="1765" dirty="0">
-              <a:latin typeface="+mj-lt"/>
-              <a:cs typeface="Arial"/>
-            </a:endParaRPr>
+            <a:r>
+              <a:rPr lang="en-US" dirty="0" smtClean="0"/>
+              <a:t>Login / Logout / Graph Calls / FB Dialogs</a:t>
+            </a:r>
+            <a:endParaRPr lang="en-US" dirty="0"/>
           </a:p>
         </p:txBody>
       </p:sp>
     </p:spTree>
     <p:extLst>
       <p:ext uri="{BB962C8B-B14F-4D97-AF65-F5344CB8AC3E}">
-        <p14:creationId xmlns:p14="http://schemas.microsoft.com/office/powerpoint/2010/main" val="1823408250"/>
-      </p:ext>
-    </p:extLst>
-  </p:cSld>
-  <p:clrMapOvr>
-    <a:masterClrMapping/>
-  </p:clrMapOvr>
-  <mc:AlternateContent xmlns:mc="http://schemas.openxmlformats.org/markup-compatibility/2006">
-    <mc:Choice xmlns:p14="http://schemas.microsoft.com/office/powerpoint/2010/main" Requires="p14">
-      <p:transition spd="slow" p14:dur="2000"/>
-    </mc:Choice>
-    <mc:Fallback>
-      <p:transition spd="slow"/>
-    </mc:Fallback>
-  </mc:AlternateContent>
-  <p:timing>
-    <p:tnLst>
-      <p:par>
-        <p:cTn id="1" dur="indefinite" restart="never" nodeType="tmRoot">
-          <p:childTnLst>
-            <p:seq concurrent="1" nextAc="seek">
-              <p:cTn id="2" dur="indefinite" nodeType="mainSeq">
-                <p:childTnLst>
-                  <p:par>
-                    <p:cTn id="3" fill="hold">
-                      <p:stCondLst>
-                        <p:cond delay="indefinite"/>
-                        <p:cond evt="onBegin" delay="0">
-                          <p:tn val="2"/>
-                        </p:cond>
-                      </p:stCondLst>
-                      <p:childTnLst>
-                        <p:par>
-                          <p:cTn id="4" fill="hold">
-                            <p:stCondLst>
-                              <p:cond delay="0"/>
-                            </p:stCondLst>
-                            <p:childTnLst>
-                              <p:par>
-                                <p:cTn id="5" presetID="10" presetClass="entr" presetSubtype="0" fill="hold" grpId="0" nodeType="afterEffect">
-                                  <p:stCondLst>
-                                    <p:cond delay="0"/>
-                                  </p:stCondLst>
-                                  <p:childTnLst>
-                                    <p:set>
-                                      <p:cBhvr>
-                                        <p:cTn id="6" dur="1" fill="hold">
-                                          <p:stCondLst>
-                                            <p:cond delay="0"/>
-                                          </p:stCondLst>
-                                        </p:cTn>
-                                        <p:tgtEl>
-                                          <p:spTgt spid="27"/>
-                                        </p:tgtEl>
-                                        <p:attrNameLst>
-                                          <p:attrName>style.visibility</p:attrName>
-                                        </p:attrNameLst>
-                                      </p:cBhvr>
-                                      <p:to>
-                                        <p:strVal val="visible"/>
-                                      </p:to>
-                                    </p:set>
-                                    <p:animEffect transition="in" filter="fade">
-                                      <p:cBhvr>
-                                        <p:cTn id="7" dur="500"/>
-                                        <p:tgtEl>
-                                          <p:spTgt spid="27"/>
-                                        </p:tgtEl>
-                                      </p:cBhvr>
-                                    </p:animEffect>
-                                  </p:childTnLst>
-                                </p:cTn>
-                              </p:par>
-                            </p:childTnLst>
-                          </p:cTn>
-                        </p:par>
-                      </p:childTnLst>
-                    </p:cTn>
-                  </p:par>
-                </p:childTnLst>
-              </p:cTn>
-              <p:prevCondLst>
-                <p:cond evt="onPrev" delay="0">
-                  <p:tgtEl>
-                    <p:sldTgt/>
-                  </p:tgtEl>
-                </p:cond>
-              </p:prevCondLst>
-              <p:nextCondLst>
-                <p:cond evt="onNext" delay="0">
-                  <p:tgtEl>
-                    <p:sldTgt/>
-                  </p:tgtEl>
-                </p:cond>
-              </p:nextCondLst>
-            </p:seq>
-          </p:childTnLst>
-        </p:cTn>
-      </p:par>
-    </p:tnLst>
-    <p:bldLst>
-      <p:bldP spid="27" grpId="0"/>
-    </p:bldLst>
-  </p:timing>
-</p:sld>
-</file>
-
-<file path=ppt/slides/slide2.xml><?xml version="1.0" encoding="utf-8"?>
-<p:sld xmlns:a="http://schemas.openxmlformats.org/drawingml/2006/main" xmlns:r="http://schemas.openxmlformats.org/officeDocument/2006/relationships" xmlns:p="http://schemas.openxmlformats.org/presentationml/2006/main">
-  <p:cSld>
-    <p:spTree>
-      <p:nvGrpSpPr>
-        <p:cNvPr id="1" name=""/>
-        <p:cNvGrpSpPr/>
-        <p:nvPr/>
-      </p:nvGrpSpPr>
-      <p:grpSpPr>
-        <a:xfrm>
-          <a:off x="0" y="0"/>
-          <a:ext cx="0" cy="0"/>
-          <a:chOff x="0" y="0"/>
-          <a:chExt cx="0" cy="0"/>
-        </a:xfrm>
-      </p:grpSpPr>
-      <p:sp>
-        <p:nvSpPr>
-          <p:cNvPr id="3" name="Title 1"/>
-          <p:cNvSpPr txBox="1">
-            <a:spLocks/>
-          </p:cNvSpPr>
-          <p:nvPr/>
-        </p:nvSpPr>
-        <p:spPr>
-          <a:xfrm>
-            <a:off x="1165665" y="3018140"/>
-            <a:ext cx="9860672" cy="821722"/>
-          </a:xfrm>
-          <a:prstGeom prst="rect">
-            <a:avLst/>
-          </a:prstGeom>
-        </p:spPr>
-        <p:txBody>
-          <a:bodyPr vert="horz" wrap="square" lIns="143428" tIns="89642" rIns="143428" bIns="89642" rtlCol="0" anchor="t">
-            <a:noAutofit/>
-          </a:bodyPr>
-          <a:lstStyle>
-            <a:lvl1pPr algn="l" defTabSz="932742" rtl="0" eaLnBrk="1" latinLnBrk="0" hangingPunct="1">
-              <a:lnSpc>
-                <a:spcPct val="90000"/>
-              </a:lnSpc>
-              <a:spcBef>
-                <a:spcPct val="0"/>
-              </a:spcBef>
-              <a:buNone/>
-              <a:defRPr lang="en-US" sz="4800" b="0" kern="1200" cap="none" spc="-102" baseline="0">
-                <a:ln w="3175">
-                  <a:noFill/>
-                </a:ln>
-                <a:gradFill>
-                  <a:gsLst>
-                    <a:gs pos="1250">
-                      <a:schemeClr val="tx1"/>
-                    </a:gs>
-                    <a:gs pos="100000">
-                      <a:schemeClr val="tx1"/>
-                    </a:gs>
-                  </a:gsLst>
-                  <a:lin ang="5400000" scaled="0"/>
-                </a:gradFill>
-                <a:effectLst/>
-                <a:latin typeface="+mj-lt"/>
-                <a:ea typeface="+mn-ea"/>
-                <a:cs typeface="Segoe UI" pitchFamily="34" charset="0"/>
-              </a:defRPr>
-            </a:lvl1pPr>
-          </a:lstStyle>
-          <a:p>
-            <a:r>
-              <a:rPr lang="en-US" sz="4705" dirty="0" smtClean="0"/>
-              <a:t>¿</a:t>
-            </a:r>
-            <a:r>
-              <a:rPr lang="en-US" sz="4705" dirty="0" err="1" smtClean="0"/>
-              <a:t>Por</a:t>
-            </a:r>
-            <a:r>
-              <a:rPr lang="en-US" sz="4705" dirty="0" smtClean="0"/>
-              <a:t> </a:t>
-            </a:r>
-            <a:r>
-              <a:rPr lang="en-US" sz="4705" dirty="0" err="1" smtClean="0"/>
-              <a:t>que</a:t>
-            </a:r>
-            <a:r>
-              <a:rPr lang="en-US" sz="4705" dirty="0" smtClean="0"/>
-              <a:t> Facebook</a:t>
-            </a:r>
-            <a:r>
-              <a:rPr lang="en-US" sz="4705" dirty="0" smtClean="0"/>
-              <a:t>?</a:t>
-            </a:r>
-            <a:endParaRPr lang="en-US" sz="4705" dirty="0"/>
-          </a:p>
-        </p:txBody>
-      </p:sp>
-    </p:spTree>
-    <p:extLst>
-      <p:ext uri="{BB962C8B-B14F-4D97-AF65-F5344CB8AC3E}">
-        <p14:creationId xmlns:p14="http://schemas.microsoft.com/office/powerpoint/2010/main" val="1040816199"/>
+        <p14:creationId xmlns:p14="http://schemas.microsoft.com/office/powerpoint/2010/main" val="1467946662"/>
       </p:ext>
     </p:extLst>
   </p:cSld>
@@ -7756,7 +6614,7 @@
 </p:sld>
 </file>
 
-<file path=ppt/slides/slide3.xml><?xml version="1.0" encoding="utf-8"?>
+<file path=ppt/slides/slide17.xml><?xml version="1.0" encoding="utf-8"?>
 <p:sld xmlns:a="http://schemas.openxmlformats.org/drawingml/2006/main" xmlns:r="http://schemas.openxmlformats.org/officeDocument/2006/relationships" xmlns:p="http://schemas.openxmlformats.org/presentationml/2006/main">
   <p:cSld>
     <p:spTree>
@@ -7775,267 +6633,17 @@
       </p:grpSpPr>
       <p:sp>
         <p:nvSpPr>
-          <p:cNvPr id="2" name="Rectangle 1"/>
-          <p:cNvSpPr/>
-          <p:nvPr/>
+          <p:cNvPr id="2" name="Title 1"/>
+          <p:cNvSpPr>
+            <a:spLocks noGrp="1"/>
+          </p:cNvSpPr>
+          <p:nvPr>
+            <p:ph type="title"/>
+          </p:nvPr>
         </p:nvSpPr>
         <p:spPr>
           <a:xfrm>
-            <a:off x="-446315" y="-204943"/>
-            <a:ext cx="12823371" cy="7389513"/>
-          </a:xfrm>
-          <a:prstGeom prst="rect">
-            <a:avLst/>
-          </a:prstGeom>
-        </p:spPr>
-        <p:style>
-          <a:lnRef idx="2">
-            <a:schemeClr val="dk1"/>
-          </a:lnRef>
-          <a:fillRef idx="1">
-            <a:schemeClr val="lt1"/>
-          </a:fillRef>
-          <a:effectRef idx="0">
-            <a:schemeClr val="dk1"/>
-          </a:effectRef>
-          <a:fontRef idx="minor">
-            <a:schemeClr val="dk1"/>
-          </a:fontRef>
-        </p:style>
-        <p:txBody>
-          <a:bodyPr rtlCol="0" anchor="ctr"/>
-          <a:lstStyle/>
-          <a:p>
-            <a:pPr algn="ctr"/>
-            <a:endParaRPr lang="en-US"/>
-          </a:p>
-        </p:txBody>
-      </p:sp>
-      <p:sp>
-        <p:nvSpPr>
-          <p:cNvPr id="3" name="Rectangle 2"/>
-          <p:cNvSpPr/>
-          <p:nvPr/>
-        </p:nvSpPr>
-        <p:spPr>
-          <a:xfrm>
-            <a:off x="525349" y="5212301"/>
-            <a:ext cx="3390672" cy="369332"/>
-          </a:xfrm>
-          <a:prstGeom prst="rect">
-            <a:avLst/>
-          </a:prstGeom>
-        </p:spPr>
-        <p:txBody>
-          <a:bodyPr wrap="none">
-            <a:spAutoFit/>
-          </a:bodyPr>
-          <a:lstStyle/>
-          <a:p>
-            <a:r>
-              <a:rPr lang="is-IS" b="1" smtClean="0">
-                <a:solidFill>
-                  <a:srgbClr val="3F3F3F"/>
-                </a:solidFill>
-                <a:latin typeface="SourceSansPro-Bold" charset="0"/>
-              </a:rPr>
-              <a:t>934 Millones de Usuarios diarios</a:t>
-            </a:r>
-            <a:endParaRPr lang="en-US" dirty="0"/>
-          </a:p>
-        </p:txBody>
-      </p:sp>
-      <p:pic>
-        <p:nvPicPr>
-          <p:cNvPr id="4" name="Picture 3"/>
-          <p:cNvPicPr>
-            <a:picLocks noChangeAspect="1"/>
-          </p:cNvPicPr>
-          <p:nvPr/>
-        </p:nvPicPr>
-        <p:blipFill>
-          <a:blip r:embed="rId3"/>
-          <a:stretch>
-            <a:fillRect/>
-          </a:stretch>
-        </p:blipFill>
-        <p:spPr>
-          <a:xfrm>
-            <a:off x="669471" y="2145794"/>
-            <a:ext cx="3102429" cy="1954530"/>
-          </a:xfrm>
-          <a:prstGeom prst="rect">
-            <a:avLst/>
-          </a:prstGeom>
-        </p:spPr>
-      </p:pic>
-      <p:sp>
-        <p:nvSpPr>
-          <p:cNvPr id="17" name="Rectangle 16"/>
-          <p:cNvSpPr/>
-          <p:nvPr/>
-        </p:nvSpPr>
-        <p:spPr>
-          <a:xfrm>
-            <a:off x="5041069" y="5212301"/>
-            <a:ext cx="1957459" cy="369332"/>
-          </a:xfrm>
-          <a:prstGeom prst="rect">
-            <a:avLst/>
-          </a:prstGeom>
-        </p:spPr>
-        <p:txBody>
-          <a:bodyPr wrap="none">
-            <a:spAutoFit/>
-          </a:bodyPr>
-          <a:lstStyle/>
-          <a:p>
-            <a:r>
-              <a:rPr lang="en-US" dirty="0" err="1" smtClean="0"/>
-              <a:t>Protocolos</a:t>
-            </a:r>
-            <a:r>
-              <a:rPr lang="en-US" dirty="0" smtClean="0"/>
-              <a:t> </a:t>
-            </a:r>
-            <a:r>
-              <a:rPr lang="en-US" dirty="0" err="1" smtClean="0"/>
-              <a:t>seguros</a:t>
-            </a:r>
-            <a:endParaRPr lang="en-US" dirty="0"/>
-          </a:p>
-        </p:txBody>
-      </p:sp>
-      <p:pic>
-        <p:nvPicPr>
-          <p:cNvPr id="8" name="Picture 7"/>
-          <p:cNvPicPr>
-            <a:picLocks noChangeAspect="1"/>
-          </p:cNvPicPr>
-          <p:nvPr/>
-        </p:nvPicPr>
-        <p:blipFill>
-          <a:blip r:embed="rId4"/>
-          <a:stretch>
-            <a:fillRect/>
-          </a:stretch>
-        </p:blipFill>
-        <p:spPr>
-          <a:xfrm>
-            <a:off x="4690998" y="1799499"/>
-            <a:ext cx="2657603" cy="2647119"/>
-          </a:xfrm>
-          <a:prstGeom prst="rect">
-            <a:avLst/>
-          </a:prstGeom>
-        </p:spPr>
-      </p:pic>
-      <p:sp>
-        <p:nvSpPr>
-          <p:cNvPr id="19" name="Rectangle 18"/>
-          <p:cNvSpPr/>
-          <p:nvPr/>
-        </p:nvSpPr>
-        <p:spPr>
-          <a:xfrm>
-            <a:off x="9255222" y="5212301"/>
-            <a:ext cx="1682640" cy="369332"/>
-          </a:xfrm>
-          <a:prstGeom prst="rect">
-            <a:avLst/>
-          </a:prstGeom>
-        </p:spPr>
-        <p:txBody>
-          <a:bodyPr wrap="none">
-            <a:spAutoFit/>
-          </a:bodyPr>
-          <a:lstStyle/>
-          <a:p>
-            <a:r>
-              <a:rPr lang="en-US" smtClean="0"/>
-              <a:t>Developer Tools</a:t>
-            </a:r>
-            <a:endParaRPr lang="en-US" dirty="0"/>
-          </a:p>
-        </p:txBody>
-      </p:sp>
-      <p:pic>
-        <p:nvPicPr>
-          <p:cNvPr id="9" name="Picture 8"/>
-          <p:cNvPicPr>
-            <a:picLocks noChangeAspect="1"/>
-          </p:cNvPicPr>
-          <p:nvPr/>
-        </p:nvPicPr>
-        <p:blipFill>
-          <a:blip r:embed="rId5"/>
-          <a:stretch>
-            <a:fillRect/>
-          </a:stretch>
-        </p:blipFill>
-        <p:spPr>
-          <a:xfrm>
-            <a:off x="8826542" y="1853058"/>
-            <a:ext cx="2540000" cy="2540000"/>
-          </a:xfrm>
-          <a:prstGeom prst="rect">
-            <a:avLst/>
-          </a:prstGeom>
-        </p:spPr>
-      </p:pic>
-    </p:spTree>
-    <p:extLst>
-      <p:ext uri="{BB962C8B-B14F-4D97-AF65-F5344CB8AC3E}">
-        <p14:creationId xmlns:p14="http://schemas.microsoft.com/office/powerpoint/2010/main" val="1541267195"/>
-      </p:ext>
-    </p:extLst>
-  </p:cSld>
-  <p:clrMapOvr>
-    <a:masterClrMapping/>
-  </p:clrMapOvr>
-  <p:transition>
-    <p:fade/>
-  </p:transition>
-  <p:timing>
-    <p:tnLst>
-      <p:par>
-        <p:cTn id="1" dur="indefinite" restart="never" nodeType="tmRoot"/>
-      </p:par>
-    </p:tnLst>
-  </p:timing>
-</p:sld>
-</file>
-
-<file path=ppt/slides/slide4.xml><?xml version="1.0" encoding="utf-8"?>
-<p:sld xmlns:a="http://schemas.openxmlformats.org/drawingml/2006/main" xmlns:r="http://schemas.openxmlformats.org/officeDocument/2006/relationships" xmlns:p="http://schemas.openxmlformats.org/presentationml/2006/main">
-  <p:cSld>
-    <p:spTree>
-      <p:nvGrpSpPr>
-        <p:cNvPr id="1" name=""/>
-        <p:cNvGrpSpPr/>
-        <p:nvPr/>
-      </p:nvGrpSpPr>
-      <p:grpSpPr>
-        <a:xfrm>
-          <a:off x="0" y="0"/>
-          <a:ext cx="0" cy="0"/>
-          <a:chOff x="0" y="0"/>
-          <a:chExt cx="0" cy="0"/>
-        </a:xfrm>
-      </p:grpSpPr>
-      <p:sp>
-        <p:nvSpPr>
-          <p:cNvPr id="2" name="Title 1"/>
-          <p:cNvSpPr>
-            <a:spLocks noGrp="1"/>
-          </p:cNvSpPr>
-          <p:nvPr>
-            <p:ph type="title"/>
-          </p:nvPr>
-        </p:nvSpPr>
-        <p:spPr>
-          <a:xfrm>
-            <a:off x="120636" y="-332456"/>
+            <a:off x="136964" y="-316127"/>
             <a:ext cx="9860672" cy="1793104"/>
           </a:xfrm>
         </p:spPr>
@@ -8044,8 +6652,8 @@
           <a:lstStyle/>
           <a:p>
             <a:r>
-              <a:rPr lang="en-US" dirty="0" err="1" smtClean="0"/>
-              <a:t>Objetivos</a:t>
+              <a:rPr lang="en-US" smtClean="0"/>
+              <a:t>Referencias</a:t>
             </a:r>
             <a:endParaRPr lang="en-US" dirty="0"/>
           </a:p>
@@ -8061,8 +6669,8 @@
         </p:nvSpPr>
         <p:spPr>
           <a:xfrm>
-            <a:off x="514702" y="1777322"/>
-            <a:ext cx="11127569" cy="4507025"/>
+            <a:off x="498374" y="1189494"/>
+            <a:ext cx="11127569" cy="5015363"/>
           </a:xfrm>
           <a:prstGeom prst="rect">
             <a:avLst/>
@@ -8300,29 +6908,22 @@
               <a:buNone/>
             </a:pPr>
             <a:r>
-              <a:rPr lang="en-US" sz="3200" dirty="0" err="1" smtClean="0"/>
-              <a:t>Crear</a:t>
-            </a:r>
-            <a:r>
               <a:rPr lang="en-US" sz="3200" dirty="0" smtClean="0"/>
-              <a:t> y </a:t>
-            </a:r>
-            <a:r>
-              <a:rPr lang="en-US" sz="3200" dirty="0" err="1" smtClean="0"/>
-              <a:t>configurar</a:t>
-            </a:r>
-            <a:r>
-              <a:rPr lang="en-US" sz="3200" dirty="0" smtClean="0"/>
-              <a:t> </a:t>
-            </a:r>
-            <a:r>
-              <a:rPr lang="en-US" sz="3200" dirty="0" err="1" smtClean="0"/>
-              <a:t>Aplicacion</a:t>
-            </a:r>
-            <a:r>
-              <a:rPr lang="en-US" sz="3200" dirty="0" smtClean="0"/>
-              <a:t> de Facebook.</a:t>
-            </a:r>
+              <a:t>FB Developer: </a:t>
+            </a:r>
+            <a:r>
+              <a:rPr lang="en-US" sz="3200" dirty="0" smtClean="0">
+                <a:hlinkClick r:id="rId2"/>
+              </a:rPr>
+              <a:t>https</a:t>
+            </a:r>
+            <a:r>
+              <a:rPr lang="en-US" sz="3200" dirty="0">
+                <a:hlinkClick r:id="rId2"/>
+              </a:rPr>
+              <a:t>://developers.facebook.com</a:t>
+            </a:r>
+            <a:endParaRPr lang="en-US" sz="3200" dirty="0"/>
           </a:p>
           <a:p>
             <a:pPr marL="0" indent="0">
@@ -8332,29 +6933,32 @@
               <a:buNone/>
             </a:pPr>
             <a:r>
-              <a:rPr lang="en-US" sz="3200" dirty="0" err="1" smtClean="0"/>
-              <a:t>Implementar</a:t>
-            </a:r>
-            <a:r>
               <a:rPr lang="en-US" sz="3200" dirty="0" smtClean="0"/>
-              <a:t> Login con Facebook en </a:t>
-            </a:r>
-            <a:r>
-              <a:rPr lang="en-US" sz="3200" dirty="0" err="1" smtClean="0"/>
-              <a:t>Aplicaciones</a:t>
-            </a:r>
-            <a:r>
-              <a:rPr lang="en-US" sz="3200" dirty="0" smtClean="0"/>
-              <a:t> </a:t>
-            </a:r>
-            <a:r>
-              <a:rPr lang="en-US" sz="3200" dirty="0" err="1" smtClean="0"/>
-              <a:t>Xamarin.Forms</a:t>
-            </a:r>
-            <a:r>
-              <a:rPr lang="en-US" sz="3200" dirty="0" smtClean="0"/>
-              <a:t>.</a:t>
-            </a:r>
+              <a:t>FB Android SDK</a:t>
+            </a:r>
+            <a:r>
+              <a:rPr lang="en-US" sz="3200" dirty="0"/>
+              <a:t>: </a:t>
+            </a:r>
+            <a:r>
+              <a:rPr lang="en-US" sz="3200" dirty="0">
+                <a:hlinkClick r:id="rId3"/>
+              </a:rPr>
+              <a:t>https://</a:t>
+            </a:r>
+            <a:r>
+              <a:rPr lang="en-US" sz="3200" dirty="0" err="1">
+                <a:hlinkClick r:id="rId3"/>
+              </a:rPr>
+              <a:t>developers.facebook.com</a:t>
+            </a:r>
+            <a:r>
+              <a:rPr lang="en-US" sz="3200" dirty="0">
+                <a:hlinkClick r:id="rId3"/>
+              </a:rPr>
+              <a:t>/docs/android</a:t>
+            </a:r>
+            <a:endParaRPr lang="en-US" sz="3200" dirty="0"/>
           </a:p>
           <a:p>
             <a:pPr marL="0" indent="0">
@@ -8364,53 +6968,42 @@
               <a:buNone/>
             </a:pPr>
             <a:r>
-              <a:rPr lang="en-US" sz="3200" dirty="0" err="1" smtClean="0"/>
-              <a:t>Crear</a:t>
+              <a:rPr lang="en-US" sz="3200" dirty="0"/>
+              <a:t>FB </a:t>
             </a:r>
             <a:r>
               <a:rPr lang="en-US" sz="3200" dirty="0" smtClean="0"/>
-              <a:t> </a:t>
-            </a:r>
-            <a:r>
-              <a:rPr lang="en-US" sz="3200" dirty="0" err="1" smtClean="0"/>
-              <a:t>llamadas</a:t>
-            </a:r>
-            <a:r>
-              <a:rPr lang="en-US" sz="3200" dirty="0" smtClean="0"/>
-              <a:t> </a:t>
-            </a:r>
-            <a:r>
-              <a:rPr lang="en-US" sz="3200" dirty="0" err="1" smtClean="0"/>
-              <a:t>OpenGraph</a:t>
-            </a:r>
-            <a:r>
-              <a:rPr lang="en-US" sz="3200" dirty="0" smtClean="0"/>
-              <a:t> para </a:t>
-            </a:r>
-            <a:r>
-              <a:rPr lang="en-US" sz="3200" dirty="0" err="1" smtClean="0"/>
-              <a:t>publicar</a:t>
-            </a:r>
-            <a:r>
-              <a:rPr lang="en-US" sz="3200" dirty="0" smtClean="0"/>
-              <a:t> </a:t>
-            </a:r>
-            <a:r>
-              <a:rPr lang="en-US" sz="3200" dirty="0" err="1" smtClean="0"/>
-              <a:t>texto</a:t>
-            </a:r>
-            <a:r>
-              <a:rPr lang="en-US" sz="3200" dirty="0" smtClean="0"/>
-              <a:t> e </a:t>
-            </a:r>
-            <a:r>
-              <a:rPr lang="en-US" sz="3200" dirty="0" err="1" smtClean="0"/>
-              <a:t>imagenes</a:t>
-            </a:r>
-            <a:r>
-              <a:rPr lang="en-US" sz="3200" dirty="0" smtClean="0"/>
-              <a:t>.</a:t>
-            </a:r>
+              <a:t>iOS </a:t>
+            </a:r>
+            <a:r>
+              <a:rPr lang="en-US" sz="3200" dirty="0"/>
+              <a:t>SDK: </a:t>
+            </a:r>
+            <a:r>
+              <a:rPr lang="en-US" sz="3200" dirty="0">
+                <a:hlinkClick r:id="rId4"/>
+              </a:rPr>
+              <a:t>https://</a:t>
+            </a:r>
+            <a:r>
+              <a:rPr lang="en-US" sz="3200" dirty="0" err="1">
+                <a:hlinkClick r:id="rId4"/>
+              </a:rPr>
+              <a:t>developers.facebook.com</a:t>
+            </a:r>
+            <a:r>
+              <a:rPr lang="en-US" sz="3200" dirty="0">
+                <a:hlinkClick r:id="rId4"/>
+              </a:rPr>
+              <a:t>/docs/</a:t>
+            </a:r>
+            <a:r>
+              <a:rPr lang="en-US" sz="3200" dirty="0" err="1">
+                <a:hlinkClick r:id="rId4"/>
+              </a:rPr>
+              <a:t>ios</a:t>
+            </a:r>
+            <a:endParaRPr lang="en-US" sz="3200" dirty="0" smtClean="0"/>
           </a:p>
           <a:p>
             <a:pPr marL="0" indent="0">
@@ -8421,48 +7014,140 @@
             </a:pPr>
             <a:r>
               <a:rPr lang="en-US" sz="3200" dirty="0" err="1" smtClean="0"/>
-              <a:t>Reutilizar</a:t>
-            </a:r>
+              <a:t>Xamarin</a:t>
+            </a:r>
+            <a:r>
+              <a:rPr lang="en-US" sz="3200" dirty="0"/>
+              <a:t> Custom </a:t>
+            </a:r>
+            <a:r>
+              <a:rPr lang="en-US" sz="3200" dirty="0" smtClean="0"/>
+              <a:t>Renderers: </a:t>
+            </a:r>
+            <a:r>
+              <a:rPr lang="en-US" sz="1600" dirty="0">
+                <a:hlinkClick r:id="rId5"/>
+              </a:rPr>
+              <a:t>https://developer.xamarin.com/guides/xamarin-forms/custom-renderer/</a:t>
+            </a:r>
+            <a:endParaRPr lang="en-US" sz="1600" dirty="0" smtClean="0"/>
+          </a:p>
+          <a:p>
+            <a:pPr marL="0" lvl="0" indent="0" defTabSz="914400">
+              <a:lnSpc>
+                <a:spcPct val="150000"/>
+              </a:lnSpc>
+              <a:spcBef>
+                <a:spcPts val="0"/>
+              </a:spcBef>
+              <a:buSzTx/>
+              <a:buNone/>
+            </a:pPr>
+            <a:r>
+              <a:rPr lang="en-US" sz="3200" dirty="0" err="1">
+                <a:solidFill>
+                  <a:prstClr val="black"/>
+                </a:solidFill>
+              </a:rPr>
+              <a:t>Xamarin</a:t>
+            </a:r>
+            <a:r>
+              <a:rPr lang="en-US" sz="3200" dirty="0">
+                <a:solidFill>
+                  <a:prstClr val="black"/>
+                </a:solidFill>
+              </a:rPr>
+              <a:t> Dependency Service</a:t>
+            </a:r>
+            <a:r>
+              <a:rPr lang="en-US" sz="3200" dirty="0">
+                <a:solidFill>
+                  <a:prstClr val="black"/>
+                </a:solidFill>
+                <a:latin typeface="Calibri" panose="020F0502020204030204"/>
+              </a:rPr>
+              <a:t>: </a:t>
+            </a:r>
+            <a:r>
+              <a:rPr lang="en-US" sz="1400" dirty="0">
+                <a:solidFill>
+                  <a:prstClr val="black"/>
+                </a:solidFill>
+                <a:latin typeface="Calibri" panose="020F0502020204030204"/>
+                <a:hlinkClick r:id="rId6"/>
+              </a:rPr>
+              <a:t>https://developer.xamarin.com/guides/xamarin-forms/dependency-service</a:t>
+            </a:r>
+            <a:r>
+              <a:rPr lang="en-US" sz="1400" dirty="0" smtClean="0">
+                <a:solidFill>
+                  <a:prstClr val="black"/>
+                </a:solidFill>
+                <a:latin typeface="Calibri" panose="020F0502020204030204"/>
+                <a:hlinkClick r:id="rId6"/>
+              </a:rPr>
+              <a:t>/</a:t>
+            </a:r>
+            <a:endParaRPr lang="en-US" sz="3200" dirty="0" smtClean="0"/>
+          </a:p>
+          <a:p>
+            <a:pPr marL="0" indent="0">
+              <a:lnSpc>
+                <a:spcPct val="150000"/>
+              </a:lnSpc>
+              <a:buNone/>
+            </a:pPr>
+            <a:r>
+              <a:rPr lang="en-US" sz="3200" dirty="0" err="1" smtClean="0"/>
+              <a:t>Codigo</a:t>
+            </a:r>
+            <a:r>
+              <a:rPr lang="en-US" sz="3200" dirty="0" smtClean="0"/>
+              <a:t> de </a:t>
+            </a:r>
+            <a:r>
+              <a:rPr lang="en-US" sz="3200" dirty="0" err="1" smtClean="0"/>
+              <a:t>Ejemplo</a:t>
+            </a:r>
+            <a:r>
+              <a:rPr lang="en-US" sz="3200" dirty="0" smtClean="0"/>
+              <a:t>: </a:t>
+            </a:r>
+            <a:r>
+              <a:rPr lang="en-US" sz="3200" dirty="0">
+                <a:hlinkClick r:id="rId7"/>
+              </a:rPr>
+              <a:t>https://goo.gl/Y8I9Dp</a:t>
+            </a:r>
+            <a:endParaRPr lang="en-US" sz="3200" dirty="0"/>
+          </a:p>
+          <a:p>
+            <a:pPr marL="0" indent="0">
+              <a:lnSpc>
+                <a:spcPct val="150000"/>
+              </a:lnSpc>
+              <a:buNone/>
+            </a:pPr>
             <a:r>
               <a:rPr lang="en-US" sz="3200" dirty="0" smtClean="0"/>
               <a:t> </a:t>
             </a:r>
-            <a:r>
-              <a:rPr lang="en-US" sz="3200" dirty="0" err="1" smtClean="0"/>
-              <a:t>codigo</a:t>
-            </a:r>
-            <a:r>
-              <a:rPr lang="en-US" sz="3200" dirty="0" smtClean="0"/>
-              <a:t> en </a:t>
-            </a:r>
-            <a:r>
-              <a:rPr lang="en-US" sz="3200" dirty="0" err="1" smtClean="0"/>
-              <a:t>tus</a:t>
-            </a:r>
-            <a:r>
-              <a:rPr lang="en-US" sz="3200" dirty="0" smtClean="0"/>
-              <a:t> </a:t>
-            </a:r>
-            <a:r>
-              <a:rPr lang="en-US" sz="3200" dirty="0" err="1" smtClean="0"/>
-              <a:t>futuros</a:t>
-            </a:r>
-            <a:r>
-              <a:rPr lang="en-US" sz="3200" dirty="0" smtClean="0"/>
-              <a:t> </a:t>
-            </a:r>
-            <a:r>
-              <a:rPr lang="en-US" sz="3200" dirty="0" err="1" smtClean="0"/>
-              <a:t>proyectos</a:t>
-            </a:r>
-            <a:endParaRPr lang="en-US" sz="3200" dirty="0"/>
+          </a:p>
+          <a:p>
+            <a:pPr marL="0" indent="0">
+              <a:lnSpc>
+                <a:spcPct val="150000"/>
+              </a:lnSpc>
+              <a:buNone/>
+            </a:pPr>
+            <a:endParaRPr lang="en-US" sz="1400" dirty="0"/>
           </a:p>
         </p:txBody>
       </p:sp>
     </p:spTree>
     <p:extLst>
       <p:ext uri="{BB962C8B-B14F-4D97-AF65-F5344CB8AC3E}">
-        <p14:creationId xmlns:p14="http://schemas.microsoft.com/office/powerpoint/2010/main" val="1729791219"/>
+        <p14:creationId xmlns:p14="http://schemas.microsoft.com/office/powerpoint/2010/main" val="29277820"/>
       </p:ext>
     </p:extLst>
   </p:cSld>
@@ -8482,7 +7167,744 @@
 </p:sld>
 </file>
 
-<file path=ppt/slides/slide5.xml><?xml version="1.0" encoding="utf-8"?>
+<file path=ppt/slides/slide18.xml><?xml version="1.0" encoding="utf-8"?>
+<p:sld xmlns:a="http://schemas.openxmlformats.org/drawingml/2006/main" xmlns:r="http://schemas.openxmlformats.org/officeDocument/2006/relationships" xmlns:p="http://schemas.openxmlformats.org/presentationml/2006/main">
+  <p:cSld>
+    <p:spTree>
+      <p:nvGrpSpPr>
+        <p:cNvPr id="1" name=""/>
+        <p:cNvGrpSpPr/>
+        <p:nvPr/>
+      </p:nvGrpSpPr>
+      <p:grpSpPr>
+        <a:xfrm>
+          <a:off x="0" y="0"/>
+          <a:ext cx="0" cy="0"/>
+          <a:chOff x="0" y="0"/>
+          <a:chExt cx="0" cy="0"/>
+        </a:xfrm>
+      </p:grpSpPr>
+      <p:sp>
+        <p:nvSpPr>
+          <p:cNvPr id="27" name="Text Placeholder 25"/>
+          <p:cNvSpPr txBox="1">
+            <a:spLocks/>
+          </p:cNvSpPr>
+          <p:nvPr/>
+        </p:nvSpPr>
+        <p:spPr bwMode="invGray">
+          <a:xfrm>
+            <a:off x="1556293" y="1685952"/>
+            <a:ext cx="10321336" cy="821723"/>
+          </a:xfrm>
+          <a:prstGeom prst="rect">
+            <a:avLst/>
+          </a:prstGeom>
+        </p:spPr>
+        <p:txBody>
+          <a:bodyPr vert="horz" wrap="square" lIns="179285" tIns="143428" rIns="179285" bIns="143428" rtlCol="0" anchor="t">
+            <a:noAutofit/>
+          </a:bodyPr>
+          <a:lstStyle>
+            <a:lvl1pPr marL="0" indent="0" algn="l" defTabSz="914166" rtl="0" eaLnBrk="1" latinLnBrk="0" hangingPunct="1">
+              <a:spcBef>
+                <a:spcPct val="20000"/>
+              </a:spcBef>
+              <a:buFont typeface="Arial" pitchFamily="34" charset="0"/>
+              <a:buNone/>
+              <a:defRPr sz="6700" kern="1200" spc="-153">
+                <a:gradFill>
+                  <a:gsLst>
+                    <a:gs pos="0">
+                      <a:schemeClr val="tx1"/>
+                    </a:gs>
+                    <a:gs pos="100000">
+                      <a:schemeClr val="tx1"/>
+                    </a:gs>
+                  </a:gsLst>
+                  <a:lin ang="5400000" scaled="0"/>
+                </a:gradFill>
+                <a:latin typeface="+mj-lt"/>
+                <a:ea typeface="+mn-ea"/>
+                <a:cs typeface="+mn-cs"/>
+              </a:defRPr>
+            </a:lvl1pPr>
+            <a:lvl2pPr marL="0" indent="0" algn="l" defTabSz="914166" rtl="0" eaLnBrk="1" latinLnBrk="0" hangingPunct="1">
+              <a:spcBef>
+                <a:spcPct val="20000"/>
+              </a:spcBef>
+              <a:buFont typeface="Arial" pitchFamily="34" charset="0"/>
+              <a:buNone/>
+              <a:defRPr sz="2800" kern="1200">
+                <a:gradFill>
+                  <a:gsLst>
+                    <a:gs pos="0">
+                      <a:schemeClr val="tx1"/>
+                    </a:gs>
+                    <a:gs pos="100000">
+                      <a:schemeClr val="tx1"/>
+                    </a:gs>
+                  </a:gsLst>
+                  <a:lin ang="5400000" scaled="0"/>
+                </a:gradFill>
+                <a:latin typeface="+mn-lt"/>
+                <a:ea typeface="+mn-ea"/>
+                <a:cs typeface="+mn-cs"/>
+              </a:defRPr>
+            </a:lvl2pPr>
+            <a:lvl3pPr marL="457082" indent="-228541" algn="l" defTabSz="914166" rtl="0" eaLnBrk="1" latinLnBrk="0" hangingPunct="1">
+              <a:spcBef>
+                <a:spcPct val="20000"/>
+              </a:spcBef>
+              <a:buFont typeface="Arial" pitchFamily="34" charset="0"/>
+              <a:buChar char="•"/>
+              <a:defRPr sz="2400" kern="1200">
+                <a:gradFill>
+                  <a:gsLst>
+                    <a:gs pos="0">
+                      <a:schemeClr val="tx1"/>
+                    </a:gs>
+                    <a:gs pos="100000">
+                      <a:schemeClr val="tx1"/>
+                    </a:gs>
+                  </a:gsLst>
+                  <a:lin ang="5400000" scaled="0"/>
+                </a:gradFill>
+                <a:latin typeface="+mn-lt"/>
+                <a:ea typeface="+mn-ea"/>
+                <a:cs typeface="+mn-cs"/>
+              </a:defRPr>
+            </a:lvl3pPr>
+            <a:lvl4pPr marL="739586" indent="-282503" algn="l" defTabSz="914166" rtl="0" eaLnBrk="1" latinLnBrk="0" hangingPunct="1">
+              <a:spcBef>
+                <a:spcPct val="20000"/>
+              </a:spcBef>
+              <a:buFont typeface="Arial" pitchFamily="34" charset="0"/>
+              <a:buChar char="–"/>
+              <a:defRPr sz="2000" kern="1200">
+                <a:gradFill>
+                  <a:gsLst>
+                    <a:gs pos="0">
+                      <a:schemeClr val="tx1"/>
+                    </a:gs>
+                    <a:gs pos="100000">
+                      <a:schemeClr val="tx1"/>
+                    </a:gs>
+                  </a:gsLst>
+                  <a:lin ang="5400000" scaled="0"/>
+                </a:gradFill>
+                <a:latin typeface="+mn-lt"/>
+                <a:ea typeface="+mn-ea"/>
+                <a:cs typeface="+mn-cs"/>
+              </a:defRPr>
+            </a:lvl4pPr>
+            <a:lvl5pPr marL="1033199" indent="-293612" algn="l" defTabSz="914166" rtl="0" eaLnBrk="1" latinLnBrk="0" hangingPunct="1">
+              <a:spcBef>
+                <a:spcPct val="20000"/>
+              </a:spcBef>
+              <a:buFont typeface="Arial" pitchFamily="34" charset="0"/>
+              <a:buChar char="»"/>
+              <a:defRPr sz="1800" kern="1200">
+                <a:gradFill>
+                  <a:gsLst>
+                    <a:gs pos="0">
+                      <a:schemeClr val="tx1"/>
+                    </a:gs>
+                    <a:gs pos="100000">
+                      <a:schemeClr val="tx1"/>
+                    </a:gs>
+                  </a:gsLst>
+                  <a:lin ang="5400000" scaled="0"/>
+                </a:gradFill>
+                <a:latin typeface="+mn-lt"/>
+                <a:ea typeface="+mn-ea"/>
+                <a:cs typeface="+mn-cs"/>
+              </a:defRPr>
+            </a:lvl5pPr>
+            <a:lvl6pPr marL="2513956" indent="-228541" algn="l" defTabSz="914166" rtl="0" eaLnBrk="1" latinLnBrk="0" hangingPunct="1">
+              <a:spcBef>
+                <a:spcPct val="20000"/>
+              </a:spcBef>
+              <a:buFont typeface="Arial" pitchFamily="34" charset="0"/>
+              <a:buChar char="•"/>
+              <a:defRPr sz="2000" kern="1200">
+                <a:solidFill>
+                  <a:schemeClr val="tx1"/>
+                </a:solidFill>
+                <a:latin typeface="+mn-lt"/>
+                <a:ea typeface="+mn-ea"/>
+                <a:cs typeface="+mn-cs"/>
+              </a:defRPr>
+            </a:lvl6pPr>
+            <a:lvl7pPr marL="2971038" indent="-228541" algn="l" defTabSz="914166" rtl="0" eaLnBrk="1" latinLnBrk="0" hangingPunct="1">
+              <a:spcBef>
+                <a:spcPct val="20000"/>
+              </a:spcBef>
+              <a:buFont typeface="Arial" pitchFamily="34" charset="0"/>
+              <a:buChar char="•"/>
+              <a:defRPr sz="2000" kern="1200">
+                <a:solidFill>
+                  <a:schemeClr val="tx1"/>
+                </a:solidFill>
+                <a:latin typeface="+mn-lt"/>
+                <a:ea typeface="+mn-ea"/>
+                <a:cs typeface="+mn-cs"/>
+              </a:defRPr>
+            </a:lvl7pPr>
+            <a:lvl8pPr marL="3428122" indent="-228541" algn="l" defTabSz="914166" rtl="0" eaLnBrk="1" latinLnBrk="0" hangingPunct="1">
+              <a:spcBef>
+                <a:spcPct val="20000"/>
+              </a:spcBef>
+              <a:buFont typeface="Arial" pitchFamily="34" charset="0"/>
+              <a:buChar char="•"/>
+              <a:defRPr sz="2000" kern="1200">
+                <a:solidFill>
+                  <a:schemeClr val="tx1"/>
+                </a:solidFill>
+                <a:latin typeface="+mn-lt"/>
+                <a:ea typeface="+mn-ea"/>
+                <a:cs typeface="+mn-cs"/>
+              </a:defRPr>
+            </a:lvl8pPr>
+            <a:lvl9pPr marL="3885204" indent="-228541" algn="l" defTabSz="914166" rtl="0" eaLnBrk="1" latinLnBrk="0" hangingPunct="1">
+              <a:spcBef>
+                <a:spcPct val="20000"/>
+              </a:spcBef>
+              <a:buFont typeface="Arial" pitchFamily="34" charset="0"/>
+              <a:buChar char="•"/>
+              <a:defRPr sz="2000" kern="1200">
+                <a:solidFill>
+                  <a:schemeClr val="tx1"/>
+                </a:solidFill>
+                <a:latin typeface="+mn-lt"/>
+                <a:ea typeface="+mn-ea"/>
+                <a:cs typeface="+mn-cs"/>
+              </a:defRPr>
+            </a:lvl9pPr>
+          </a:lstStyle>
+          <a:p>
+            <a:pPr defTabSz="914367">
+              <a:lnSpc>
+                <a:spcPct val="60000"/>
+              </a:lnSpc>
+              <a:buClr>
+                <a:srgbClr val="FFFFFF"/>
+              </a:buClr>
+              <a:buSzPct val="90000"/>
+            </a:pPr>
+            <a:r>
+              <a:rPr lang="en-US" sz="7646" spc="0" dirty="0" smtClean="0">
+                <a:solidFill>
+                  <a:schemeClr val="tx1"/>
+                </a:solidFill>
+              </a:rPr>
+              <a:t>Gracias, ¿</a:t>
+            </a:r>
+            <a:r>
+              <a:rPr lang="en-US" sz="7646" spc="0" dirty="0" err="1" smtClean="0">
+                <a:solidFill>
+                  <a:schemeClr val="tx1"/>
+                </a:solidFill>
+              </a:rPr>
+              <a:t>Preguntas</a:t>
+            </a:r>
+            <a:r>
+              <a:rPr lang="en-US" sz="7646" spc="0" dirty="0" smtClean="0">
+                <a:solidFill>
+                  <a:schemeClr val="tx1"/>
+                </a:solidFill>
+              </a:rPr>
+              <a:t>?</a:t>
+            </a:r>
+            <a:endParaRPr lang="en-US" sz="7646" spc="0" dirty="0">
+              <a:solidFill>
+                <a:schemeClr val="tx1"/>
+              </a:solidFill>
+              <a:latin typeface="+mn-lt"/>
+            </a:endParaRPr>
+          </a:p>
+        </p:txBody>
+      </p:sp>
+      <p:sp>
+        <p:nvSpPr>
+          <p:cNvPr id="8" name="TextBox 7"/>
+          <p:cNvSpPr txBox="1"/>
+          <p:nvPr/>
+        </p:nvSpPr>
+        <p:spPr>
+          <a:xfrm>
+            <a:off x="4145965" y="-846623"/>
+            <a:ext cx="362072" cy="621556"/>
+          </a:xfrm>
+          <a:prstGeom prst="rect">
+            <a:avLst/>
+          </a:prstGeom>
+          <a:noFill/>
+        </p:spPr>
+        <p:txBody>
+          <a:bodyPr wrap="none" lIns="179285" tIns="143428" rIns="179285" bIns="143428" rtlCol="0">
+            <a:spAutoFit/>
+          </a:bodyPr>
+          <a:lstStyle/>
+          <a:p>
+            <a:pPr>
+              <a:lnSpc>
+                <a:spcPct val="90000"/>
+              </a:lnSpc>
+              <a:spcAft>
+                <a:spcPts val="588"/>
+              </a:spcAft>
+            </a:pPr>
+            <a:endParaRPr lang="en-US" sz="2353" dirty="0" err="1">
+              <a:gradFill>
+                <a:gsLst>
+                  <a:gs pos="2917">
+                    <a:schemeClr val="tx1"/>
+                  </a:gs>
+                  <a:gs pos="30000">
+                    <a:schemeClr val="tx1"/>
+                  </a:gs>
+                </a:gsLst>
+                <a:lin ang="5400000" scaled="0"/>
+              </a:gradFill>
+            </a:endParaRPr>
+          </a:p>
+        </p:txBody>
+      </p:sp>
+      <p:sp>
+        <p:nvSpPr>
+          <p:cNvPr id="12" name="TextBox 11"/>
+          <p:cNvSpPr txBox="1"/>
+          <p:nvPr/>
+        </p:nvSpPr>
+        <p:spPr>
+          <a:xfrm>
+            <a:off x="1736345" y="4325390"/>
+            <a:ext cx="4122014" cy="942965"/>
+          </a:xfrm>
+          <a:prstGeom prst="rect">
+            <a:avLst/>
+          </a:prstGeom>
+          <a:noFill/>
+          <a:ln w="12700" cap="flat">
+            <a:noFill/>
+            <a:miter lim="400000"/>
+          </a:ln>
+          <a:effectLst/>
+        </p:spPr>
+        <p:style>
+          <a:lnRef idx="0">
+            <a:scrgbClr r="0" g="0" b="0"/>
+          </a:lnRef>
+          <a:fillRef idx="0">
+            <a:scrgbClr r="0" g="0" b="0"/>
+          </a:fillRef>
+          <a:effectRef idx="0">
+            <a:scrgbClr r="0" g="0" b="0"/>
+          </a:effectRef>
+          <a:fontRef idx="none"/>
+        </p:style>
+        <p:txBody>
+          <a:bodyPr rot="0" spcFirstLastPara="1" vertOverflow="overflow" horzOverflow="overflow" vert="horz" wrap="square" lIns="18676" tIns="18676" rIns="18676" bIns="18676" numCol="1" spcCol="14288" rtlCol="0" anchor="ctr">
+            <a:spAutoFit/>
+          </a:bodyPr>
+          <a:lstStyle/>
+          <a:p>
+            <a:r>
+              <a:rPr lang="en-US" sz="2000" dirty="0" smtClean="0"/>
+              <a:t>Alejandro Ruiz / Guillermo </a:t>
+            </a:r>
+            <a:r>
+              <a:rPr lang="en-US" sz="2000" dirty="0" err="1" smtClean="0"/>
+              <a:t>Tinoco</a:t>
+            </a:r>
+            <a:endParaRPr lang="en-US" sz="2000" dirty="0" smtClean="0"/>
+          </a:p>
+          <a:p>
+            <a:r>
+              <a:rPr lang="en-US" sz="1961" dirty="0" smtClean="0">
+                <a:cs typeface="Arial"/>
+              </a:rPr>
+              <a:t>Los </a:t>
+            </a:r>
+            <a:r>
+              <a:rPr lang="en-US" sz="1961" dirty="0" err="1" smtClean="0">
+                <a:cs typeface="Arial"/>
+              </a:rPr>
+              <a:t>Xamarinos</a:t>
+            </a:r>
+            <a:endParaRPr lang="en-US" sz="1961" dirty="0">
+              <a:cs typeface="Arial"/>
+            </a:endParaRPr>
+          </a:p>
+          <a:p>
+            <a:r>
+              <a:rPr lang="en-US" sz="1961" dirty="0" err="1" smtClean="0">
+                <a:latin typeface="+mj-lt"/>
+                <a:cs typeface="Arial"/>
+              </a:rPr>
+              <a:t>Xamarin.Forms</a:t>
+            </a:r>
+            <a:r>
+              <a:rPr lang="en-US" sz="1961" dirty="0" smtClean="0">
+                <a:latin typeface="+mj-lt"/>
+                <a:cs typeface="Arial"/>
+              </a:rPr>
+              <a:t> + Facebook</a:t>
+            </a:r>
+            <a:endParaRPr lang="en-US" sz="1961" dirty="0">
+              <a:latin typeface="+mj-lt"/>
+              <a:cs typeface="Arial"/>
+            </a:endParaRPr>
+          </a:p>
+        </p:txBody>
+      </p:sp>
+      <p:cxnSp>
+        <p:nvCxnSpPr>
+          <p:cNvPr id="14" name="Straight Connector 13"/>
+          <p:cNvCxnSpPr/>
+          <p:nvPr/>
+        </p:nvCxnSpPr>
+        <p:spPr>
+          <a:xfrm flipV="1">
+            <a:off x="1775731" y="5590692"/>
+            <a:ext cx="9367329" cy="4668"/>
+          </a:xfrm>
+          <a:prstGeom prst="line">
+            <a:avLst/>
+          </a:prstGeom>
+          <a:ln>
+            <a:solidFill>
+              <a:srgbClr val="16ACEE"/>
+            </a:solidFill>
+            <a:headEnd type="none"/>
+            <a:tailEnd type="none"/>
+          </a:ln>
+        </p:spPr>
+        <p:style>
+          <a:lnRef idx="2">
+            <a:schemeClr val="accent6"/>
+          </a:lnRef>
+          <a:fillRef idx="0">
+            <a:schemeClr val="accent6"/>
+          </a:fillRef>
+          <a:effectRef idx="1">
+            <a:schemeClr val="accent6"/>
+          </a:effectRef>
+          <a:fontRef idx="minor">
+            <a:schemeClr val="tx1"/>
+          </a:fontRef>
+        </p:style>
+      </p:cxnSp>
+      <p:grpSp>
+        <p:nvGrpSpPr>
+          <p:cNvPr id="9" name="Group 8"/>
+          <p:cNvGrpSpPr/>
+          <p:nvPr/>
+        </p:nvGrpSpPr>
+        <p:grpSpPr>
+          <a:xfrm>
+            <a:off x="1701028" y="5819471"/>
+            <a:ext cx="6120358" cy="772446"/>
+            <a:chOff x="1735136" y="5935664"/>
+            <a:chExt cx="6243084" cy="787935"/>
+          </a:xfrm>
+        </p:grpSpPr>
+        <p:sp>
+          <p:nvSpPr>
+            <p:cNvPr id="10" name="TextBox 9"/>
+            <p:cNvSpPr txBox="1"/>
+            <p:nvPr/>
+          </p:nvSpPr>
+          <p:spPr>
+            <a:xfrm>
+              <a:off x="1735136" y="5935664"/>
+              <a:ext cx="6243084" cy="780882"/>
+            </a:xfrm>
+            <a:prstGeom prst="rect">
+              <a:avLst/>
+            </a:prstGeom>
+            <a:noFill/>
+          </p:spPr>
+          <p:txBody>
+            <a:bodyPr wrap="square" rtlCol="0">
+              <a:spAutoFit/>
+            </a:bodyPr>
+            <a:lstStyle/>
+            <a:p>
+              <a:pPr>
+                <a:lnSpc>
+                  <a:spcPct val="130000"/>
+                </a:lnSpc>
+              </a:pPr>
+              <a:r>
+                <a:rPr lang="en-US" sz="1600" dirty="0" smtClean="0">
+                  <a:hlinkClick r:id="rId3"/>
+                </a:rPr>
+                <a:t>alejandro.ruiz@xamarinos.com</a:t>
+              </a:r>
+              <a:r>
+                <a:rPr lang="en-US" sz="1600" dirty="0" smtClean="0"/>
+                <a:t> - </a:t>
+              </a:r>
+              <a:r>
+                <a:rPr lang="en-US" sz="1600" dirty="0" smtClean="0">
+                  <a:hlinkClick r:id="rId4"/>
+                </a:rPr>
+                <a:t>guillermo.tinoco@xamarinos.com</a:t>
+              </a:r>
+              <a:r>
+                <a:rPr lang="en-US" sz="1600" dirty="0" smtClean="0"/>
+                <a:t> </a:t>
+              </a:r>
+            </a:p>
+            <a:p>
+              <a:pPr>
+                <a:lnSpc>
+                  <a:spcPct val="130000"/>
+                </a:lnSpc>
+              </a:pPr>
+              <a:endParaRPr lang="en-US" sz="1765" dirty="0">
+                <a:latin typeface="+mj-lt"/>
+                <a:cs typeface="Arial"/>
+              </a:endParaRPr>
+            </a:p>
+          </p:txBody>
+        </p:sp>
+        <p:sp>
+          <p:nvSpPr>
+            <p:cNvPr id="15" name="TextBox 14"/>
+            <p:cNvSpPr txBox="1"/>
+            <p:nvPr/>
+          </p:nvSpPr>
+          <p:spPr>
+            <a:xfrm>
+              <a:off x="2743242" y="6269224"/>
+              <a:ext cx="3138277" cy="454375"/>
+            </a:xfrm>
+            <a:prstGeom prst="rect">
+              <a:avLst/>
+            </a:prstGeom>
+            <a:noFill/>
+          </p:spPr>
+          <p:txBody>
+            <a:bodyPr wrap="square" rtlCol="0">
+              <a:spAutoFit/>
+            </a:bodyPr>
+            <a:lstStyle/>
+            <a:p>
+              <a:pPr>
+                <a:lnSpc>
+                  <a:spcPct val="130000"/>
+                </a:lnSpc>
+              </a:pPr>
+              <a:r>
+                <a:rPr lang="en-US" sz="1765" dirty="0" smtClean="0">
+                  <a:latin typeface="+mj-lt"/>
+                  <a:cs typeface="Arial"/>
+                </a:rPr>
+                <a:t>@</a:t>
+              </a:r>
+              <a:r>
+                <a:rPr lang="en-US" sz="1765" dirty="0" err="1" smtClean="0">
+                  <a:latin typeface="+mj-lt"/>
+                  <a:cs typeface="Arial"/>
+                </a:rPr>
+                <a:t>alejandroruizva</a:t>
+              </a:r>
+              <a:r>
+                <a:rPr lang="en-US" sz="1765" dirty="0" smtClean="0">
+                  <a:latin typeface="+mj-lt"/>
+                  <a:cs typeface="Arial"/>
+                </a:rPr>
+                <a:t> - @</a:t>
+              </a:r>
+              <a:r>
+                <a:rPr lang="cs-CZ" sz="1765" dirty="0" smtClean="0">
+                  <a:latin typeface="+mj-lt"/>
+                  <a:cs typeface="Arial"/>
+                </a:rPr>
+                <a:t>m3mo89</a:t>
+              </a:r>
+              <a:endParaRPr lang="en-US" sz="1765" dirty="0">
+                <a:latin typeface="+mj-lt"/>
+                <a:cs typeface="Arial"/>
+              </a:endParaRPr>
+            </a:p>
+          </p:txBody>
+        </p:sp>
+      </p:grpSp>
+      <p:sp>
+        <p:nvSpPr>
+          <p:cNvPr id="13" name="TextBox 12"/>
+          <p:cNvSpPr txBox="1"/>
+          <p:nvPr/>
+        </p:nvSpPr>
+        <p:spPr>
+          <a:xfrm>
+            <a:off x="7821386" y="6299499"/>
+            <a:ext cx="4559270" cy="765532"/>
+          </a:xfrm>
+          <a:prstGeom prst="rect">
+            <a:avLst/>
+          </a:prstGeom>
+          <a:noFill/>
+        </p:spPr>
+        <p:txBody>
+          <a:bodyPr wrap="square" rtlCol="0">
+            <a:spAutoFit/>
+          </a:bodyPr>
+          <a:lstStyle/>
+          <a:p>
+            <a:pPr>
+              <a:lnSpc>
+                <a:spcPct val="130000"/>
+              </a:lnSpc>
+            </a:pPr>
+            <a:r>
+              <a:rPr lang="en-US" sz="1600" dirty="0" smtClean="0">
+                <a:hlinkClick r:id="rId5"/>
+              </a:rPr>
+              <a:t>http://</a:t>
+            </a:r>
+            <a:r>
+              <a:rPr lang="en-US" sz="1600" dirty="0" err="1" smtClean="0">
+                <a:hlinkClick r:id="rId5"/>
+              </a:rPr>
+              <a:t>alejandroruizvarela.blogspot.com</a:t>
+            </a:r>
+            <a:r>
+              <a:rPr lang="en-US" sz="1600" dirty="0" smtClean="0">
+                <a:hlinkClick r:id="rId5"/>
+              </a:rPr>
+              <a:t> </a:t>
+            </a:r>
+            <a:endParaRPr lang="en-US" sz="1600" dirty="0" smtClean="0"/>
+          </a:p>
+          <a:p>
+            <a:pPr>
+              <a:lnSpc>
+                <a:spcPct val="130000"/>
+              </a:lnSpc>
+            </a:pPr>
+            <a:endParaRPr lang="en-US" sz="1765" dirty="0">
+              <a:latin typeface="+mj-lt"/>
+              <a:cs typeface="Arial"/>
+            </a:endParaRPr>
+          </a:p>
+        </p:txBody>
+      </p:sp>
+    </p:spTree>
+    <p:extLst>
+      <p:ext uri="{BB962C8B-B14F-4D97-AF65-F5344CB8AC3E}">
+        <p14:creationId xmlns:p14="http://schemas.microsoft.com/office/powerpoint/2010/main" val="1823408250"/>
+      </p:ext>
+    </p:extLst>
+  </p:cSld>
+  <p:clrMapOvr>
+    <a:masterClrMapping/>
+  </p:clrMapOvr>
+  <mc:AlternateContent xmlns:mc="http://schemas.openxmlformats.org/markup-compatibility/2006" xmlns:p14="http://schemas.microsoft.com/office/powerpoint/2010/main">
+    <mc:Choice Requires="p14">
+      <p:transition spd="slow" p14:dur="2000"/>
+    </mc:Choice>
+    <mc:Fallback xmlns="">
+      <p:transition spd="slow"/>
+    </mc:Fallback>
+  </mc:AlternateContent>
+  <p:timing>
+    <p:tnLst>
+      <p:par>
+        <p:cTn id="1" dur="indefinite" restart="never" nodeType="tmRoot">
+          <p:childTnLst>
+            <p:seq concurrent="1" nextAc="seek">
+              <p:cTn id="2" dur="indefinite" nodeType="mainSeq">
+                <p:childTnLst>
+                  <p:par>
+                    <p:cTn id="3" fill="hold">
+                      <p:stCondLst>
+                        <p:cond delay="indefinite"/>
+                        <p:cond evt="onBegin" delay="0">
+                          <p:tn val="2"/>
+                        </p:cond>
+                      </p:stCondLst>
+                      <p:childTnLst>
+                        <p:par>
+                          <p:cTn id="4" fill="hold">
+                            <p:stCondLst>
+                              <p:cond delay="0"/>
+                            </p:stCondLst>
+                            <p:childTnLst>
+                              <p:par>
+                                <p:cTn id="5" presetID="10" presetClass="entr" presetSubtype="0" fill="hold" grpId="0" nodeType="afterEffect">
+                                  <p:stCondLst>
+                                    <p:cond delay="0"/>
+                                  </p:stCondLst>
+                                  <p:childTnLst>
+                                    <p:set>
+                                      <p:cBhvr>
+                                        <p:cTn id="6" dur="1" fill="hold">
+                                          <p:stCondLst>
+                                            <p:cond delay="0"/>
+                                          </p:stCondLst>
+                                        </p:cTn>
+                                        <p:tgtEl>
+                                          <p:spTgt spid="27"/>
+                                        </p:tgtEl>
+                                        <p:attrNameLst>
+                                          <p:attrName>style.visibility</p:attrName>
+                                        </p:attrNameLst>
+                                      </p:cBhvr>
+                                      <p:to>
+                                        <p:strVal val="visible"/>
+                                      </p:to>
+                                    </p:set>
+                                    <p:animEffect transition="in" filter="fade">
+                                      <p:cBhvr>
+                                        <p:cTn id="7" dur="500"/>
+                                        <p:tgtEl>
+                                          <p:spTgt spid="27"/>
+                                        </p:tgtEl>
+                                      </p:cBhvr>
+                                    </p:animEffect>
+                                  </p:childTnLst>
+                                </p:cTn>
+                              </p:par>
+                            </p:childTnLst>
+                          </p:cTn>
+                        </p:par>
+                      </p:childTnLst>
+                    </p:cTn>
+                  </p:par>
+                </p:childTnLst>
+              </p:cTn>
+              <p:prevCondLst>
+                <p:cond evt="onPrev" delay="0">
+                  <p:tgtEl>
+                    <p:sldTgt/>
+                  </p:tgtEl>
+                </p:cond>
+              </p:prevCondLst>
+              <p:nextCondLst>
+                <p:cond evt="onNext" delay="0">
+                  <p:tgtEl>
+                    <p:sldTgt/>
+                  </p:tgtEl>
+                </p:cond>
+              </p:nextCondLst>
+            </p:seq>
+          </p:childTnLst>
+        </p:cTn>
+      </p:par>
+    </p:tnLst>
+    <p:bldLst>
+      <p:bldP spid="27" grpId="0"/>
+    </p:bldLst>
+  </p:timing>
+</p:sld>
+</file>
+
+<file path=ppt/slides/slide2.xml><?xml version="1.0" encoding="utf-8"?>
 <p:sld xmlns:a="http://schemas.openxmlformats.org/drawingml/2006/main" xmlns:r="http://schemas.openxmlformats.org/officeDocument/2006/relationships" xmlns:p="http://schemas.openxmlformats.org/presentationml/2006/main">
   <p:cSld>
     <p:spTree>
@@ -8554,11 +7976,23 @@
           <a:p>
             <a:r>
               <a:rPr lang="en-US" sz="4705" dirty="0" smtClean="0"/>
-              <a:t>Manos a la </a:t>
+              <a:t>¿</a:t>
             </a:r>
             <a:r>
               <a:rPr lang="en-US" sz="4705" dirty="0" err="1" smtClean="0"/>
-              <a:t>obra</a:t>
+              <a:t>Por</a:t>
+            </a:r>
+            <a:r>
+              <a:rPr lang="en-US" sz="4705" dirty="0" smtClean="0"/>
+              <a:t> </a:t>
+            </a:r>
+            <a:r>
+              <a:rPr lang="en-US" sz="4705" dirty="0" err="1" smtClean="0"/>
+              <a:t>que</a:t>
+            </a:r>
+            <a:r>
+              <a:rPr lang="en-US" sz="4705" dirty="0" smtClean="0"/>
+              <a:t> Facebook?</a:t>
             </a:r>
             <a:endParaRPr lang="en-US" sz="4705" dirty="0"/>
           </a:p>
@@ -8567,7 +8001,7 @@
     </p:spTree>
     <p:extLst>
       <p:ext uri="{BB962C8B-B14F-4D97-AF65-F5344CB8AC3E}">
-        <p14:creationId xmlns:p14="http://schemas.microsoft.com/office/powerpoint/2010/main" val="772130430"/>
+        <p14:creationId xmlns:p14="http://schemas.microsoft.com/office/powerpoint/2010/main" val="1040816199"/>
       </p:ext>
     </p:extLst>
   </p:cSld>
@@ -8587,7 +8021,7 @@
 </p:sld>
 </file>
 
-<file path=ppt/slides/slide6.xml><?xml version="1.0" encoding="utf-8"?>
+<file path=ppt/slides/slide3.xml><?xml version="1.0" encoding="utf-8"?>
 <p:sld xmlns:a="http://schemas.openxmlformats.org/drawingml/2006/main" xmlns:r="http://schemas.openxmlformats.org/officeDocument/2006/relationships" xmlns:p="http://schemas.openxmlformats.org/presentationml/2006/main">
   <p:cSld>
     <p:spTree>
@@ -8606,36 +8040,277 @@
       </p:grpSpPr>
       <p:sp>
         <p:nvSpPr>
-          <p:cNvPr id="4" name="Title 1"/>
-          <p:cNvSpPr>
-            <a:spLocks noGrp="1"/>
-          </p:cNvSpPr>
-          <p:nvPr>
-            <p:ph type="title"/>
-          </p:nvPr>
+          <p:cNvPr id="2" name="Rectangle 1"/>
+          <p:cNvSpPr/>
+          <p:nvPr/>
         </p:nvSpPr>
         <p:spPr>
           <a:xfrm>
-            <a:off x="269241" y="289957"/>
-            <a:ext cx="11655840" cy="899537"/>
+            <a:off x="-446315" y="-204943"/>
+            <a:ext cx="12823371" cy="7389513"/>
+          </a:xfrm>
+          <a:prstGeom prst="rect">
+            <a:avLst/>
+          </a:prstGeom>
+        </p:spPr>
+        <p:style>
+          <a:lnRef idx="2">
+            <a:schemeClr val="dk1"/>
+          </a:lnRef>
+          <a:fillRef idx="1">
+            <a:schemeClr val="lt1"/>
+          </a:fillRef>
+          <a:effectRef idx="0">
+            <a:schemeClr val="dk1"/>
+          </a:effectRef>
+          <a:fontRef idx="minor">
+            <a:schemeClr val="dk1"/>
+          </a:fontRef>
+        </p:style>
+        <p:txBody>
+          <a:bodyPr rtlCol="0" anchor="ctr"/>
+          <a:lstStyle/>
+          <a:p>
+            <a:pPr algn="ctr"/>
+            <a:endParaRPr lang="en-US"/>
+          </a:p>
+        </p:txBody>
+      </p:sp>
+      <p:sp>
+        <p:nvSpPr>
+          <p:cNvPr id="3" name="Rectangle 2"/>
+          <p:cNvSpPr/>
+          <p:nvPr/>
+        </p:nvSpPr>
+        <p:spPr>
+          <a:xfrm>
+            <a:off x="525349" y="5212301"/>
+            <a:ext cx="3390672" cy="369332"/>
+          </a:xfrm>
+          <a:prstGeom prst="rect">
+            <a:avLst/>
+          </a:prstGeom>
+        </p:spPr>
+        <p:txBody>
+          <a:bodyPr wrap="none">
+            <a:spAutoFit/>
+          </a:bodyPr>
+          <a:lstStyle/>
+          <a:p>
+            <a:r>
+              <a:rPr lang="is-IS" b="1" smtClean="0">
+                <a:solidFill>
+                  <a:srgbClr val="3F3F3F"/>
+                </a:solidFill>
+                <a:latin typeface="SourceSansPro-Bold" charset="0"/>
+              </a:rPr>
+              <a:t>934 Millones de Usuarios diarios</a:t>
+            </a:r>
+            <a:endParaRPr lang="en-US" dirty="0"/>
+          </a:p>
+        </p:txBody>
+      </p:sp>
+      <p:pic>
+        <p:nvPicPr>
+          <p:cNvPr id="4" name="Picture 3"/>
+          <p:cNvPicPr>
+            <a:picLocks noChangeAspect="1"/>
+          </p:cNvPicPr>
+          <p:nvPr/>
+        </p:nvPicPr>
+        <p:blipFill>
+          <a:blip r:embed="rId3"/>
+          <a:stretch>
+            <a:fillRect/>
+          </a:stretch>
+        </p:blipFill>
+        <p:spPr>
+          <a:xfrm>
+            <a:off x="669471" y="2145794"/>
+            <a:ext cx="3102429" cy="1954530"/>
+          </a:xfrm>
+          <a:prstGeom prst="rect">
+            <a:avLst/>
+          </a:prstGeom>
+        </p:spPr>
+      </p:pic>
+      <p:sp>
+        <p:nvSpPr>
+          <p:cNvPr id="17" name="Rectangle 16"/>
+          <p:cNvSpPr/>
+          <p:nvPr/>
+        </p:nvSpPr>
+        <p:spPr>
+          <a:xfrm>
+            <a:off x="5041069" y="5212301"/>
+            <a:ext cx="1957459" cy="369332"/>
+          </a:xfrm>
+          <a:prstGeom prst="rect">
+            <a:avLst/>
+          </a:prstGeom>
+        </p:spPr>
+        <p:txBody>
+          <a:bodyPr wrap="none">
+            <a:spAutoFit/>
+          </a:bodyPr>
+          <a:lstStyle/>
+          <a:p>
+            <a:r>
+              <a:rPr lang="en-US" dirty="0" err="1" smtClean="0"/>
+              <a:t>Protocolos</a:t>
+            </a:r>
+            <a:r>
+              <a:rPr lang="en-US" dirty="0" smtClean="0"/>
+              <a:t> </a:t>
+            </a:r>
+            <a:r>
+              <a:rPr lang="en-US" dirty="0" err="1" smtClean="0"/>
+              <a:t>seguros</a:t>
+            </a:r>
+            <a:endParaRPr lang="en-US" dirty="0"/>
+          </a:p>
+        </p:txBody>
+      </p:sp>
+      <p:pic>
+        <p:nvPicPr>
+          <p:cNvPr id="8" name="Picture 7"/>
+          <p:cNvPicPr>
+            <a:picLocks noChangeAspect="1"/>
+          </p:cNvPicPr>
+          <p:nvPr/>
+        </p:nvPicPr>
+        <p:blipFill>
+          <a:blip r:embed="rId4"/>
+          <a:stretch>
+            <a:fillRect/>
+          </a:stretch>
+        </p:blipFill>
+        <p:spPr>
+          <a:xfrm>
+            <a:off x="4690998" y="1799499"/>
+            <a:ext cx="2657603" cy="2647119"/>
+          </a:xfrm>
+          <a:prstGeom prst="rect">
+            <a:avLst/>
+          </a:prstGeom>
+        </p:spPr>
+      </p:pic>
+      <p:sp>
+        <p:nvSpPr>
+          <p:cNvPr id="19" name="Rectangle 18"/>
+          <p:cNvSpPr/>
+          <p:nvPr/>
+        </p:nvSpPr>
+        <p:spPr>
+          <a:xfrm>
+            <a:off x="9255222" y="5212301"/>
+            <a:ext cx="1682640" cy="369332"/>
+          </a:xfrm>
+          <a:prstGeom prst="rect">
+            <a:avLst/>
+          </a:prstGeom>
+        </p:spPr>
+        <p:txBody>
+          <a:bodyPr wrap="none">
+            <a:spAutoFit/>
+          </a:bodyPr>
+          <a:lstStyle/>
+          <a:p>
+            <a:r>
+              <a:rPr lang="en-US" smtClean="0"/>
+              <a:t>Developer Tools</a:t>
+            </a:r>
+            <a:endParaRPr lang="en-US" dirty="0"/>
+          </a:p>
+        </p:txBody>
+      </p:sp>
+      <p:pic>
+        <p:nvPicPr>
+          <p:cNvPr id="9" name="Picture 8"/>
+          <p:cNvPicPr>
+            <a:picLocks noChangeAspect="1"/>
+          </p:cNvPicPr>
+          <p:nvPr/>
+        </p:nvPicPr>
+        <p:blipFill>
+          <a:blip r:embed="rId5"/>
+          <a:stretch>
+            <a:fillRect/>
+          </a:stretch>
+        </p:blipFill>
+        <p:spPr>
+          <a:xfrm>
+            <a:off x="8826542" y="1853058"/>
+            <a:ext cx="2540000" cy="2540000"/>
+          </a:xfrm>
+          <a:prstGeom prst="rect">
+            <a:avLst/>
+          </a:prstGeom>
+        </p:spPr>
+      </p:pic>
+    </p:spTree>
+    <p:extLst>
+      <p:ext uri="{BB962C8B-B14F-4D97-AF65-F5344CB8AC3E}">
+        <p14:creationId xmlns:p14="http://schemas.microsoft.com/office/powerpoint/2010/main" val="1541267195"/>
+      </p:ext>
+    </p:extLst>
+  </p:cSld>
+  <p:clrMapOvr>
+    <a:masterClrMapping/>
+  </p:clrMapOvr>
+  <p:transition>
+    <p:fade/>
+  </p:transition>
+  <p:timing>
+    <p:tnLst>
+      <p:par>
+        <p:cTn id="1" dur="indefinite" restart="never" nodeType="tmRoot"/>
+      </p:par>
+    </p:tnLst>
+  </p:timing>
+</p:sld>
+</file>
+
+<file path=ppt/slides/slide4.xml><?xml version="1.0" encoding="utf-8"?>
+<p:sld xmlns:a="http://schemas.openxmlformats.org/drawingml/2006/main" xmlns:r="http://schemas.openxmlformats.org/officeDocument/2006/relationships" xmlns:p="http://schemas.openxmlformats.org/presentationml/2006/main">
+  <p:cSld>
+    <p:spTree>
+      <p:nvGrpSpPr>
+        <p:cNvPr id="1" name=""/>
+        <p:cNvGrpSpPr/>
+        <p:nvPr/>
+      </p:nvGrpSpPr>
+      <p:grpSpPr>
+        <a:xfrm>
+          <a:off x="0" y="0"/>
+          <a:ext cx="0" cy="0"/>
+          <a:chOff x="0" y="0"/>
+          <a:chExt cx="0" cy="0"/>
+        </a:xfrm>
+      </p:grpSpPr>
+      <p:sp>
+        <p:nvSpPr>
+          <p:cNvPr id="2" name="Title 1"/>
+          <p:cNvSpPr>
+            <a:spLocks noGrp="1"/>
+          </p:cNvSpPr>
+          <p:nvPr>
+            <p:ph type="title"/>
+          </p:nvPr>
+        </p:nvSpPr>
+        <p:spPr>
+          <a:xfrm>
+            <a:off x="120636" y="-332456"/>
+            <a:ext cx="9860672" cy="1793104"/>
           </a:xfrm>
         </p:spPr>
         <p:txBody>
           <a:bodyPr/>
           <a:lstStyle/>
           <a:p>
-            <a:pPr algn="ctr"/>
             <a:r>
               <a:rPr lang="en-US" dirty="0" err="1" smtClean="0"/>
-              <a:t>Pasos</a:t>
-            </a:r>
-            <a:r>
-              <a:rPr lang="en-US" dirty="0" smtClean="0"/>
-              <a:t> </a:t>
-            </a:r>
-            <a:r>
-              <a:rPr lang="en-US" dirty="0" err="1" smtClean="0"/>
-              <a:t>Iniciales</a:t>
+              <a:t>Objetivos</a:t>
             </a:r>
             <a:endParaRPr lang="en-US" dirty="0"/>
           </a:p>
@@ -8643,7 +8318,7 @@
       </p:sp>
       <p:sp>
         <p:nvSpPr>
-          <p:cNvPr id="5" name="Text Placeholder 7"/>
+          <p:cNvPr id="3" name="Text Placeholder 7"/>
           <p:cNvSpPr txBox="1">
             <a:spLocks/>
           </p:cNvSpPr>
@@ -8651,7 +8326,7 @@
         </p:nvSpPr>
         <p:spPr>
           <a:xfrm>
-            <a:off x="498374" y="1189494"/>
+            <a:off x="514702" y="1777322"/>
             <a:ext cx="11127569" cy="4507025"/>
           </a:xfrm>
           <a:prstGeom prst="rect">
@@ -8891,6 +8566,596 @@
             </a:pPr>
             <a:r>
               <a:rPr lang="en-US" sz="3200" dirty="0" err="1" smtClean="0"/>
+              <a:t>Crear</a:t>
+            </a:r>
+            <a:r>
+              <a:rPr lang="en-US" sz="3200" dirty="0" smtClean="0"/>
+              <a:t> y </a:t>
+            </a:r>
+            <a:r>
+              <a:rPr lang="en-US" sz="3200" dirty="0" err="1" smtClean="0"/>
+              <a:t>configurar</a:t>
+            </a:r>
+            <a:r>
+              <a:rPr lang="en-US" sz="3200" dirty="0" smtClean="0"/>
+              <a:t> </a:t>
+            </a:r>
+            <a:r>
+              <a:rPr lang="en-US" sz="3200" dirty="0" err="1" smtClean="0"/>
+              <a:t>Aplicacion</a:t>
+            </a:r>
+            <a:r>
+              <a:rPr lang="en-US" sz="3200" dirty="0" smtClean="0"/>
+              <a:t> de Facebook.</a:t>
+            </a:r>
+          </a:p>
+          <a:p>
+            <a:pPr marL="0" indent="0">
+              <a:lnSpc>
+                <a:spcPct val="150000"/>
+              </a:lnSpc>
+              <a:buNone/>
+            </a:pPr>
+            <a:r>
+              <a:rPr lang="en-US" sz="3200" dirty="0" err="1" smtClean="0"/>
+              <a:t>Implementar</a:t>
+            </a:r>
+            <a:r>
+              <a:rPr lang="en-US" sz="3200" dirty="0" smtClean="0"/>
+              <a:t> Login con Facebook en </a:t>
+            </a:r>
+            <a:r>
+              <a:rPr lang="en-US" sz="3200" dirty="0" err="1" smtClean="0"/>
+              <a:t>Aplicaciones</a:t>
+            </a:r>
+            <a:r>
+              <a:rPr lang="en-US" sz="3200" dirty="0" smtClean="0"/>
+              <a:t> </a:t>
+            </a:r>
+            <a:r>
+              <a:rPr lang="en-US" sz="3200" dirty="0" err="1" smtClean="0"/>
+              <a:t>Xamarin.Forms</a:t>
+            </a:r>
+            <a:r>
+              <a:rPr lang="en-US" sz="3200" dirty="0" smtClean="0"/>
+              <a:t>.</a:t>
+            </a:r>
+          </a:p>
+          <a:p>
+            <a:pPr marL="0" indent="0">
+              <a:lnSpc>
+                <a:spcPct val="150000"/>
+              </a:lnSpc>
+              <a:buNone/>
+            </a:pPr>
+            <a:r>
+              <a:rPr lang="en-US" sz="3200" dirty="0" err="1" smtClean="0"/>
+              <a:t>Crear</a:t>
+            </a:r>
+            <a:r>
+              <a:rPr lang="en-US" sz="3200" dirty="0" smtClean="0"/>
+              <a:t> </a:t>
+            </a:r>
+            <a:r>
+              <a:rPr lang="en-US" sz="3200" dirty="0" err="1" smtClean="0"/>
+              <a:t>llamadas</a:t>
+            </a:r>
+            <a:r>
+              <a:rPr lang="en-US" sz="3200" dirty="0" smtClean="0"/>
+              <a:t> </a:t>
+            </a:r>
+            <a:r>
+              <a:rPr lang="en-US" sz="3200" dirty="0" err="1" smtClean="0"/>
+              <a:t>OpenGraph</a:t>
+            </a:r>
+            <a:r>
+              <a:rPr lang="en-US" sz="3200" dirty="0" smtClean="0"/>
+              <a:t> para </a:t>
+            </a:r>
+            <a:r>
+              <a:rPr lang="en-US" sz="3200" dirty="0" err="1" smtClean="0"/>
+              <a:t>publicar</a:t>
+            </a:r>
+            <a:r>
+              <a:rPr lang="en-US" sz="3200" dirty="0" smtClean="0"/>
+              <a:t> </a:t>
+            </a:r>
+            <a:r>
+              <a:rPr lang="en-US" sz="3200" dirty="0" err="1" smtClean="0"/>
+              <a:t>texto</a:t>
+            </a:r>
+            <a:r>
+              <a:rPr lang="en-US" sz="3200" dirty="0" smtClean="0"/>
+              <a:t> e </a:t>
+            </a:r>
+            <a:r>
+              <a:rPr lang="en-US" sz="3200" dirty="0" err="1" smtClean="0"/>
+              <a:t>imagenes</a:t>
+            </a:r>
+            <a:r>
+              <a:rPr lang="en-US" sz="3200" dirty="0" smtClean="0"/>
+              <a:t>.</a:t>
+            </a:r>
+          </a:p>
+          <a:p>
+            <a:pPr marL="0" indent="0">
+              <a:lnSpc>
+                <a:spcPct val="150000"/>
+              </a:lnSpc>
+              <a:buNone/>
+            </a:pPr>
+            <a:r>
+              <a:rPr lang="en-US" sz="3200" dirty="0" err="1" smtClean="0"/>
+              <a:t>Reutilizar</a:t>
+            </a:r>
+            <a:r>
+              <a:rPr lang="en-US" sz="3200" dirty="0" smtClean="0"/>
+              <a:t> </a:t>
+            </a:r>
+            <a:r>
+              <a:rPr lang="en-US" sz="3200" dirty="0" err="1" smtClean="0"/>
+              <a:t>codigo</a:t>
+            </a:r>
+            <a:r>
+              <a:rPr lang="en-US" sz="3200" dirty="0" smtClean="0"/>
+              <a:t> en </a:t>
+            </a:r>
+            <a:r>
+              <a:rPr lang="en-US" sz="3200" dirty="0" err="1" smtClean="0"/>
+              <a:t>tus</a:t>
+            </a:r>
+            <a:r>
+              <a:rPr lang="en-US" sz="3200" dirty="0" smtClean="0"/>
+              <a:t> </a:t>
+            </a:r>
+            <a:r>
+              <a:rPr lang="en-US" sz="3200" dirty="0" err="1" smtClean="0"/>
+              <a:t>futuros</a:t>
+            </a:r>
+            <a:r>
+              <a:rPr lang="en-US" sz="3200" dirty="0" smtClean="0"/>
+              <a:t> </a:t>
+            </a:r>
+            <a:r>
+              <a:rPr lang="en-US" sz="3200" dirty="0" err="1" smtClean="0"/>
+              <a:t>proyectos</a:t>
+            </a:r>
+            <a:endParaRPr lang="en-US" sz="3200" dirty="0"/>
+          </a:p>
+        </p:txBody>
+      </p:sp>
+    </p:spTree>
+    <p:extLst>
+      <p:ext uri="{BB962C8B-B14F-4D97-AF65-F5344CB8AC3E}">
+        <p14:creationId xmlns:p14="http://schemas.microsoft.com/office/powerpoint/2010/main" val="1729791219"/>
+      </p:ext>
+    </p:extLst>
+  </p:cSld>
+  <p:clrMapOvr>
+    <a:masterClrMapping/>
+  </p:clrMapOvr>
+  <p:transition>
+    <p:fade/>
+  </p:transition>
+  <p:timing>
+    <p:tnLst>
+      <p:par>
+        <p:cTn id="1" dur="indefinite" restart="never" nodeType="tmRoot"/>
+      </p:par>
+    </p:tnLst>
+  </p:timing>
+</p:sld>
+</file>
+
+<file path=ppt/slides/slide5.xml><?xml version="1.0" encoding="utf-8"?>
+<p:sld xmlns:a="http://schemas.openxmlformats.org/drawingml/2006/main" xmlns:r="http://schemas.openxmlformats.org/officeDocument/2006/relationships" xmlns:p="http://schemas.openxmlformats.org/presentationml/2006/main">
+  <p:cSld>
+    <p:spTree>
+      <p:nvGrpSpPr>
+        <p:cNvPr id="1" name=""/>
+        <p:cNvGrpSpPr/>
+        <p:nvPr/>
+      </p:nvGrpSpPr>
+      <p:grpSpPr>
+        <a:xfrm>
+          <a:off x="0" y="0"/>
+          <a:ext cx="0" cy="0"/>
+          <a:chOff x="0" y="0"/>
+          <a:chExt cx="0" cy="0"/>
+        </a:xfrm>
+      </p:grpSpPr>
+      <p:sp>
+        <p:nvSpPr>
+          <p:cNvPr id="3" name="Title 1"/>
+          <p:cNvSpPr txBox="1">
+            <a:spLocks/>
+          </p:cNvSpPr>
+          <p:nvPr/>
+        </p:nvSpPr>
+        <p:spPr>
+          <a:xfrm>
+            <a:off x="1165665" y="3018140"/>
+            <a:ext cx="9860672" cy="821722"/>
+          </a:xfrm>
+          <a:prstGeom prst="rect">
+            <a:avLst/>
+          </a:prstGeom>
+        </p:spPr>
+        <p:txBody>
+          <a:bodyPr vert="horz" wrap="square" lIns="143428" tIns="89642" rIns="143428" bIns="89642" rtlCol="0" anchor="t">
+            <a:noAutofit/>
+          </a:bodyPr>
+          <a:lstStyle>
+            <a:lvl1pPr algn="l" defTabSz="932742" rtl="0" eaLnBrk="1" latinLnBrk="0" hangingPunct="1">
+              <a:lnSpc>
+                <a:spcPct val="90000"/>
+              </a:lnSpc>
+              <a:spcBef>
+                <a:spcPct val="0"/>
+              </a:spcBef>
+              <a:buNone/>
+              <a:defRPr lang="en-US" sz="4800" b="0" kern="1200" cap="none" spc="-102" baseline="0">
+                <a:ln w="3175">
+                  <a:noFill/>
+                </a:ln>
+                <a:gradFill>
+                  <a:gsLst>
+                    <a:gs pos="1250">
+                      <a:schemeClr val="tx1"/>
+                    </a:gs>
+                    <a:gs pos="100000">
+                      <a:schemeClr val="tx1"/>
+                    </a:gs>
+                  </a:gsLst>
+                  <a:lin ang="5400000" scaled="0"/>
+                </a:gradFill>
+                <a:effectLst/>
+                <a:latin typeface="+mj-lt"/>
+                <a:ea typeface="+mn-ea"/>
+                <a:cs typeface="Segoe UI" pitchFamily="34" charset="0"/>
+              </a:defRPr>
+            </a:lvl1pPr>
+          </a:lstStyle>
+          <a:p>
+            <a:r>
+              <a:rPr lang="en-US" sz="4705" dirty="0" smtClean="0"/>
+              <a:t>Manos a la </a:t>
+            </a:r>
+            <a:r>
+              <a:rPr lang="en-US" sz="4705" dirty="0" err="1" smtClean="0"/>
+              <a:t>obra</a:t>
+            </a:r>
+            <a:endParaRPr lang="en-US" sz="4705" dirty="0"/>
+          </a:p>
+        </p:txBody>
+      </p:sp>
+    </p:spTree>
+    <p:extLst>
+      <p:ext uri="{BB962C8B-B14F-4D97-AF65-F5344CB8AC3E}">
+        <p14:creationId xmlns:p14="http://schemas.microsoft.com/office/powerpoint/2010/main" val="772130430"/>
+      </p:ext>
+    </p:extLst>
+  </p:cSld>
+  <p:clrMapOvr>
+    <a:masterClrMapping/>
+  </p:clrMapOvr>
+  <p:transition>
+    <p:fade/>
+  </p:transition>
+  <p:timing>
+    <p:tnLst>
+      <p:par>
+        <p:cTn id="1" dur="indefinite" restart="never" nodeType="tmRoot"/>
+      </p:par>
+    </p:tnLst>
+  </p:timing>
+</p:sld>
+</file>
+
+<file path=ppt/slides/slide6.xml><?xml version="1.0" encoding="utf-8"?>
+<p:sld xmlns:a="http://schemas.openxmlformats.org/drawingml/2006/main" xmlns:r="http://schemas.openxmlformats.org/officeDocument/2006/relationships" xmlns:p="http://schemas.openxmlformats.org/presentationml/2006/main">
+  <p:cSld>
+    <p:spTree>
+      <p:nvGrpSpPr>
+        <p:cNvPr id="1" name=""/>
+        <p:cNvGrpSpPr/>
+        <p:nvPr/>
+      </p:nvGrpSpPr>
+      <p:grpSpPr>
+        <a:xfrm>
+          <a:off x="0" y="0"/>
+          <a:ext cx="0" cy="0"/>
+          <a:chOff x="0" y="0"/>
+          <a:chExt cx="0" cy="0"/>
+        </a:xfrm>
+      </p:grpSpPr>
+      <p:sp>
+        <p:nvSpPr>
+          <p:cNvPr id="4" name="Title 1"/>
+          <p:cNvSpPr>
+            <a:spLocks noGrp="1"/>
+          </p:cNvSpPr>
+          <p:nvPr>
+            <p:ph type="title"/>
+          </p:nvPr>
+        </p:nvSpPr>
+        <p:spPr>
+          <a:xfrm>
+            <a:off x="269241" y="289957"/>
+            <a:ext cx="11655840" cy="899537"/>
+          </a:xfrm>
+        </p:spPr>
+        <p:txBody>
+          <a:bodyPr/>
+          <a:lstStyle/>
+          <a:p>
+            <a:pPr algn="ctr"/>
+            <a:r>
+              <a:rPr lang="en-US" dirty="0" err="1" smtClean="0"/>
+              <a:t>Pasos</a:t>
+            </a:r>
+            <a:r>
+              <a:rPr lang="en-US" dirty="0" smtClean="0"/>
+              <a:t> </a:t>
+            </a:r>
+            <a:r>
+              <a:rPr lang="en-US" dirty="0" err="1" smtClean="0"/>
+              <a:t>Iniciales</a:t>
+            </a:r>
+            <a:endParaRPr lang="en-US" dirty="0"/>
+          </a:p>
+        </p:txBody>
+      </p:sp>
+      <p:sp>
+        <p:nvSpPr>
+          <p:cNvPr id="5" name="Text Placeholder 7"/>
+          <p:cNvSpPr txBox="1">
+            <a:spLocks/>
+          </p:cNvSpPr>
+          <p:nvPr/>
+        </p:nvSpPr>
+        <p:spPr>
+          <a:xfrm>
+            <a:off x="498374" y="1189494"/>
+            <a:ext cx="11127569" cy="4507025"/>
+          </a:xfrm>
+          <a:prstGeom prst="rect">
+            <a:avLst/>
+          </a:prstGeom>
+        </p:spPr>
+        <p:txBody>
+          <a:bodyPr/>
+          <a:lstStyle>
+            <a:lvl1pPr marL="336145" marR="0" indent="-336145" algn="l" defTabSz="914367" rtl="0" eaLnBrk="1" fontAlgn="auto" latinLnBrk="0" hangingPunct="1">
+              <a:lnSpc>
+                <a:spcPct val="90000"/>
+              </a:lnSpc>
+              <a:spcBef>
+                <a:spcPct val="20000"/>
+              </a:spcBef>
+              <a:spcAft>
+                <a:spcPts val="0"/>
+              </a:spcAft>
+              <a:buClrTx/>
+              <a:buSzPct val="90000"/>
+              <a:buFont typeface="Arial" pitchFamily="34" charset="0"/>
+              <a:buChar char="•"/>
+              <a:tabLst/>
+              <a:defRPr sz="3921" kern="1200" spc="0" baseline="0">
+                <a:gradFill>
+                  <a:gsLst>
+                    <a:gs pos="1250">
+                      <a:schemeClr val="tx1"/>
+                    </a:gs>
+                    <a:gs pos="100000">
+                      <a:schemeClr val="tx1"/>
+                    </a:gs>
+                  </a:gsLst>
+                  <a:lin ang="5400000" scaled="0"/>
+                </a:gradFill>
+                <a:latin typeface="+mj-lt"/>
+                <a:ea typeface="+mn-ea"/>
+                <a:cs typeface="+mn-cs"/>
+              </a:defRPr>
+            </a:lvl1pPr>
+            <a:lvl2pPr marL="572691" marR="0" indent="-236546" algn="l" defTabSz="914367" rtl="0" eaLnBrk="1" fontAlgn="auto" latinLnBrk="0" hangingPunct="1">
+              <a:lnSpc>
+                <a:spcPct val="90000"/>
+              </a:lnSpc>
+              <a:spcBef>
+                <a:spcPct val="20000"/>
+              </a:spcBef>
+              <a:spcAft>
+                <a:spcPts val="0"/>
+              </a:spcAft>
+              <a:buClrTx/>
+              <a:buSzPct val="90000"/>
+              <a:buFont typeface="Arial" pitchFamily="34" charset="0"/>
+              <a:buChar char="•"/>
+              <a:tabLst/>
+              <a:defRPr sz="2353" kern="1200" spc="0" baseline="0">
+                <a:gradFill>
+                  <a:gsLst>
+                    <a:gs pos="1250">
+                      <a:schemeClr val="tx1"/>
+                    </a:gs>
+                    <a:gs pos="100000">
+                      <a:schemeClr val="tx1"/>
+                    </a:gs>
+                  </a:gsLst>
+                  <a:lin ang="5400000" scaled="0"/>
+                </a:gradFill>
+                <a:latin typeface="+mn-lt"/>
+                <a:ea typeface="+mn-ea"/>
+                <a:cs typeface="+mn-cs"/>
+              </a:defRPr>
+            </a:lvl2pPr>
+            <a:lvl3pPr marL="784338" marR="0" indent="-224097" algn="l" defTabSz="914367" rtl="0" eaLnBrk="1" fontAlgn="auto" latinLnBrk="0" hangingPunct="1">
+              <a:lnSpc>
+                <a:spcPct val="90000"/>
+              </a:lnSpc>
+              <a:spcBef>
+                <a:spcPct val="20000"/>
+              </a:spcBef>
+              <a:spcAft>
+                <a:spcPts val="0"/>
+              </a:spcAft>
+              <a:buClrTx/>
+              <a:buSzPct val="90000"/>
+              <a:buFont typeface="Arial" pitchFamily="34" charset="0"/>
+              <a:buChar char="•"/>
+              <a:tabLst/>
+              <a:defRPr sz="1961" kern="1200" spc="0" baseline="0">
+                <a:gradFill>
+                  <a:gsLst>
+                    <a:gs pos="1250">
+                      <a:schemeClr val="tx1"/>
+                    </a:gs>
+                    <a:gs pos="100000">
+                      <a:schemeClr val="tx1"/>
+                    </a:gs>
+                  </a:gsLst>
+                  <a:lin ang="5400000" scaled="0"/>
+                </a:gradFill>
+                <a:latin typeface="+mn-lt"/>
+                <a:ea typeface="+mn-ea"/>
+                <a:cs typeface="+mn-cs"/>
+              </a:defRPr>
+            </a:lvl3pPr>
+            <a:lvl4pPr marL="1008435" marR="0" indent="-224097" algn="l" defTabSz="914367" rtl="0" eaLnBrk="1" fontAlgn="auto" latinLnBrk="0" hangingPunct="1">
+              <a:lnSpc>
+                <a:spcPct val="90000"/>
+              </a:lnSpc>
+              <a:spcBef>
+                <a:spcPct val="20000"/>
+              </a:spcBef>
+              <a:spcAft>
+                <a:spcPts val="0"/>
+              </a:spcAft>
+              <a:buClrTx/>
+              <a:buSzPct val="90000"/>
+              <a:buFont typeface="Arial" pitchFamily="34" charset="0"/>
+              <a:buChar char="•"/>
+              <a:tabLst/>
+              <a:defRPr sz="1765" kern="1200" spc="0" baseline="0">
+                <a:gradFill>
+                  <a:gsLst>
+                    <a:gs pos="1250">
+                      <a:schemeClr val="tx1"/>
+                    </a:gs>
+                    <a:gs pos="100000">
+                      <a:schemeClr val="tx1"/>
+                    </a:gs>
+                  </a:gsLst>
+                  <a:lin ang="5400000" scaled="0"/>
+                </a:gradFill>
+                <a:latin typeface="+mn-lt"/>
+                <a:ea typeface="+mn-ea"/>
+                <a:cs typeface="+mn-cs"/>
+              </a:defRPr>
+            </a:lvl4pPr>
+            <a:lvl5pPr marL="1232531" marR="0" indent="-224097" algn="l" defTabSz="914367" rtl="0" eaLnBrk="1" fontAlgn="auto" latinLnBrk="0" hangingPunct="1">
+              <a:lnSpc>
+                <a:spcPct val="90000"/>
+              </a:lnSpc>
+              <a:spcBef>
+                <a:spcPct val="20000"/>
+              </a:spcBef>
+              <a:spcAft>
+                <a:spcPts val="0"/>
+              </a:spcAft>
+              <a:buClrTx/>
+              <a:buSzPct val="90000"/>
+              <a:buFont typeface="Arial" pitchFamily="34" charset="0"/>
+              <a:buChar char="•"/>
+              <a:tabLst/>
+              <a:defRPr sz="1765" kern="1200" spc="0" baseline="0">
+                <a:gradFill>
+                  <a:gsLst>
+                    <a:gs pos="1250">
+                      <a:schemeClr val="tx1"/>
+                    </a:gs>
+                    <a:gs pos="100000">
+                      <a:schemeClr val="tx1"/>
+                    </a:gs>
+                  </a:gsLst>
+                  <a:lin ang="5400000" scaled="0"/>
+                </a:gradFill>
+                <a:latin typeface="+mn-lt"/>
+                <a:ea typeface="+mn-ea"/>
+                <a:cs typeface="+mn-cs"/>
+              </a:defRPr>
+            </a:lvl5pPr>
+            <a:lvl6pPr marL="2514509" indent="-228592" algn="l" defTabSz="914367" rtl="0" eaLnBrk="1" latinLnBrk="0" hangingPunct="1">
+              <a:spcBef>
+                <a:spcPct val="20000"/>
+              </a:spcBef>
+              <a:buFont typeface="Arial" pitchFamily="34" charset="0"/>
+              <a:buChar char="•"/>
+              <a:defRPr sz="1961" kern="1200">
+                <a:solidFill>
+                  <a:schemeClr val="tx1"/>
+                </a:solidFill>
+                <a:latin typeface="+mn-lt"/>
+                <a:ea typeface="+mn-ea"/>
+                <a:cs typeface="+mn-cs"/>
+              </a:defRPr>
+            </a:lvl6pPr>
+            <a:lvl7pPr marL="2971693" indent="-228592" algn="l" defTabSz="914367" rtl="0" eaLnBrk="1" latinLnBrk="0" hangingPunct="1">
+              <a:spcBef>
+                <a:spcPct val="20000"/>
+              </a:spcBef>
+              <a:buFont typeface="Arial" pitchFamily="34" charset="0"/>
+              <a:buChar char="•"/>
+              <a:defRPr sz="1961" kern="1200">
+                <a:solidFill>
+                  <a:schemeClr val="tx1"/>
+                </a:solidFill>
+                <a:latin typeface="+mn-lt"/>
+                <a:ea typeface="+mn-ea"/>
+                <a:cs typeface="+mn-cs"/>
+              </a:defRPr>
+            </a:lvl7pPr>
+            <a:lvl8pPr marL="3428877" indent="-228592" algn="l" defTabSz="914367" rtl="0" eaLnBrk="1" latinLnBrk="0" hangingPunct="1">
+              <a:spcBef>
+                <a:spcPct val="20000"/>
+              </a:spcBef>
+              <a:buFont typeface="Arial" pitchFamily="34" charset="0"/>
+              <a:buChar char="•"/>
+              <a:defRPr sz="1961" kern="1200">
+                <a:solidFill>
+                  <a:schemeClr val="tx1"/>
+                </a:solidFill>
+                <a:latin typeface="+mn-lt"/>
+                <a:ea typeface="+mn-ea"/>
+                <a:cs typeface="+mn-cs"/>
+              </a:defRPr>
+            </a:lvl8pPr>
+            <a:lvl9pPr marL="3886061" indent="-228592" algn="l" defTabSz="914367" rtl="0" eaLnBrk="1" latinLnBrk="0" hangingPunct="1">
+              <a:spcBef>
+                <a:spcPct val="20000"/>
+              </a:spcBef>
+              <a:buFont typeface="Arial" pitchFamily="34" charset="0"/>
+              <a:buChar char="•"/>
+              <a:defRPr sz="1961" kern="1200">
+                <a:solidFill>
+                  <a:schemeClr val="tx1"/>
+                </a:solidFill>
+                <a:latin typeface="+mn-lt"/>
+                <a:ea typeface="+mn-ea"/>
+                <a:cs typeface="+mn-cs"/>
+              </a:defRPr>
+            </a:lvl9pPr>
+          </a:lstStyle>
+          <a:p>
+            <a:pPr marL="0" indent="0">
+              <a:lnSpc>
+                <a:spcPct val="150000"/>
+              </a:lnSpc>
+              <a:buNone/>
+            </a:pPr>
+            <a:r>
+              <a:rPr lang="en-US" sz="3200" dirty="0" err="1" smtClean="0"/>
               <a:t>Generar</a:t>
             </a:r>
             <a:r>
@@ -9429,7 +9694,6 @@
               <a:rPr lang="en-US" sz="4400" dirty="0"/>
               <a:t> Mobile</a:t>
             </a:r>
-            <a:endParaRPr lang="en-US" sz="4400" dirty="0"/>
           </a:p>
         </p:txBody>
       </p:sp>

</xml_diff>